<commit_message>
Reviewed speech by Genoveva
</commit_message>
<xml_diff>
--- a/Presentations/ADBIS 2016/Presentation_ADBIS 2016.pptx
+++ b/Presentations/ADBIS 2016/Presentation_ADBIS 2016.pptx
@@ -235,7 +235,7 @@
           <a:p>
             <a:fld id="{652FA383-9D4B-AD42-9BF3-88FCA749BE0E}" type="datetimeFigureOut">
               <a:rPr lang="en-US" smtClean="0"/>
-              <a:t>8/20/2016</a:t>
+              <a:t>8/22/16</a:t>
             </a:fld>
             <a:endParaRPr lang="pt-BR"/>
           </a:p>
@@ -301,7 +301,7 @@
           <a:p>
             <a:fld id="{9A622828-1E86-1441-9A56-10C9EB14358D}" type="slidenum">
               <a:rPr lang="pt-BR" smtClean="0"/>
-              <a:t>‹nº›</a:t>
+              <a:t>‹#›</a:t>
             </a:fld>
             <a:endParaRPr lang="pt-BR"/>
           </a:p>
@@ -400,7 +400,7 @@
           <a:p>
             <a:fld id="{C888862E-4053-6841-80C1-EE02861216A5}" type="datetimeFigureOut">
               <a:rPr lang="en-US" smtClean="0"/>
-              <a:t>8/20/2016</a:t>
+              <a:t>8/22/16</a:t>
             </a:fld>
             <a:endParaRPr lang="pt-BR"/>
           </a:p>
@@ -559,7 +559,7 @@
           <a:p>
             <a:fld id="{E6F8DC79-C430-E548-A754-84842F9135C3}" type="slidenum">
               <a:rPr lang="pt-BR" smtClean="0"/>
-              <a:t>‹nº›</a:t>
+              <a:t>‹#›</a:t>
             </a:fld>
             <a:endParaRPr lang="pt-BR"/>
           </a:p>
@@ -1232,12 +1232,154 @@
               <a:rPr lang="fr-FR" baseline="0" dirty="0" smtClean="0">
                 <a:latin typeface="Calibri"/>
               </a:rPr>
-              <a:t>, the different concrete services can be combined in order to achieve the user needs for instance we can combine...</a:t>
-            </a:r>
-            <a:endParaRPr lang="es-ES_tradnl" dirty="0" smtClean="0"/>
-          </a:p>
-          <a:p>
-            <a:endParaRPr lang="fr-FR" dirty="0">
+              <a:t>, the different concrete services can be combined in order to </a:t>
+            </a:r>
+            <a:r>
+              <a:rPr lang="fr-FR" baseline="0" dirty="0" err="1" smtClean="0">
+                <a:latin typeface="Calibri"/>
+              </a:rPr>
+              <a:t>produce</a:t>
+            </a:r>
+            <a:r>
+              <a:rPr lang="fr-FR" baseline="0" dirty="0" smtClean="0">
+                <a:latin typeface="Calibri"/>
+              </a:rPr>
+              <a:t> </a:t>
+            </a:r>
+            <a:r>
+              <a:rPr lang="fr-FR" baseline="0" dirty="0" err="1" smtClean="0">
+                <a:latin typeface="Calibri"/>
+              </a:rPr>
+              <a:t>results</a:t>
+            </a:r>
+            <a:r>
+              <a:rPr lang="fr-FR" baseline="0" dirty="0" smtClean="0">
+                <a:latin typeface="Calibri"/>
+              </a:rPr>
+              <a:t>. </a:t>
+            </a:r>
+            <a:r>
+              <a:rPr lang="fr-FR" baseline="0" dirty="0" err="1" smtClean="0">
+                <a:latin typeface="Calibri"/>
+              </a:rPr>
+              <a:t>Different</a:t>
+            </a:r>
+            <a:r>
+              <a:rPr lang="fr-FR" baseline="0" dirty="0" smtClean="0">
+                <a:latin typeface="Calibri"/>
+              </a:rPr>
+              <a:t> </a:t>
+            </a:r>
+            <a:r>
+              <a:rPr lang="fr-FR" baseline="0" dirty="0" err="1" smtClean="0">
+                <a:latin typeface="Calibri"/>
+              </a:rPr>
+              <a:t>possibilities</a:t>
+            </a:r>
+            <a:r>
+              <a:rPr lang="fr-FR" baseline="0" dirty="0" smtClean="0">
+                <a:latin typeface="Calibri"/>
+              </a:rPr>
+              <a:t> are possible:</a:t>
+            </a:r>
+          </a:p>
+          <a:p>
+            <a:endParaRPr lang="fr-FR" baseline="0" dirty="0" smtClean="0">
+              <a:latin typeface="Calibri"/>
+            </a:endParaRPr>
+          </a:p>
+          <a:p>
+            <a:r>
+              <a:rPr lang="fr-FR" b="1" baseline="0" dirty="0" smtClean="0">
+                <a:latin typeface="Calibri"/>
+              </a:rPr>
+              <a:t>(Write </a:t>
+            </a:r>
+            <a:r>
+              <a:rPr lang="fr-FR" b="1" baseline="0" dirty="0" err="1" smtClean="0">
+                <a:latin typeface="Calibri"/>
+              </a:rPr>
+              <a:t>everything</a:t>
+            </a:r>
+            <a:r>
+              <a:rPr lang="fr-FR" b="1" baseline="0" dirty="0" smtClean="0">
+                <a:latin typeface="Calibri"/>
+              </a:rPr>
+              <a:t> </a:t>
+            </a:r>
+            <a:r>
+              <a:rPr lang="fr-FR" b="1" baseline="0" dirty="0" err="1" smtClean="0">
+                <a:latin typeface="Calibri"/>
+              </a:rPr>
+              <a:t>particularly</a:t>
+            </a:r>
+            <a:r>
+              <a:rPr lang="fr-FR" b="1" baseline="0" dirty="0" smtClean="0">
+                <a:latin typeface="Calibri"/>
+              </a:rPr>
+              <a:t> a transition </a:t>
+            </a:r>
+            <a:r>
+              <a:rPr lang="fr-FR" b="1" baseline="0" dirty="0" err="1" smtClean="0">
+                <a:latin typeface="Calibri"/>
+              </a:rPr>
+              <a:t>explaining</a:t>
+            </a:r>
+            <a:r>
+              <a:rPr lang="fr-FR" b="1" baseline="0" dirty="0" smtClean="0">
+                <a:latin typeface="Calibri"/>
+              </a:rPr>
+              <a:t> </a:t>
+            </a:r>
+            <a:r>
+              <a:rPr lang="fr-FR" b="1" baseline="0" dirty="0" err="1" smtClean="0">
+                <a:latin typeface="Calibri"/>
+              </a:rPr>
+              <a:t>that</a:t>
+            </a:r>
+            <a:r>
+              <a:rPr lang="fr-FR" b="1" baseline="0" dirty="0" smtClean="0">
+                <a:latin typeface="Calibri"/>
+              </a:rPr>
+              <a:t> </a:t>
+            </a:r>
+            <a:r>
+              <a:rPr lang="fr-FR" b="1" baseline="0" dirty="0" err="1" smtClean="0">
+                <a:latin typeface="Calibri"/>
+              </a:rPr>
+              <a:t>filtering</a:t>
+            </a:r>
+            <a:r>
+              <a:rPr lang="fr-FR" b="1" baseline="0" dirty="0" smtClean="0">
+                <a:latin typeface="Calibri"/>
+              </a:rPr>
+              <a:t> must </a:t>
+            </a:r>
+            <a:r>
+              <a:rPr lang="fr-FR" b="1" baseline="0" dirty="0" err="1" smtClean="0">
+                <a:latin typeface="Calibri"/>
+              </a:rPr>
+              <a:t>be</a:t>
+            </a:r>
+            <a:r>
+              <a:rPr lang="fr-FR" b="1" baseline="0" dirty="0" smtClean="0">
+                <a:latin typeface="Calibri"/>
+              </a:rPr>
+              <a:t> </a:t>
+            </a:r>
+            <a:r>
+              <a:rPr lang="fr-FR" b="1" baseline="0" dirty="0" err="1" smtClean="0">
+                <a:latin typeface="Calibri"/>
+              </a:rPr>
+              <a:t>considered</a:t>
+            </a:r>
+            <a:r>
+              <a:rPr lang="fr-FR" b="1" baseline="0" dirty="0" smtClean="0">
+                <a:latin typeface="Calibri"/>
+              </a:rPr>
+              <a:t>)</a:t>
+            </a:r>
+            <a:endParaRPr lang="fr-FR" b="1" dirty="0">
               <a:latin typeface="Calibri"/>
             </a:endParaRPr>
           </a:p>
@@ -1433,12 +1575,20 @@
           <a:lstStyle/>
           <a:p>
             <a:r>
-              <a:rPr lang="fr-FR" dirty="0" smtClean="0"/>
-              <a:t>Considering</a:t>
-            </a:r>
-            <a:r>
               <a:rPr lang="fr-FR" baseline="0" dirty="0" smtClean="0"/>
-              <a:t> our new vision of data integration, our objective is to....</a:t>
+              <a:t>In </a:t>
+            </a:r>
+            <a:r>
+              <a:rPr lang="fr-FR" baseline="0" dirty="0" err="1" smtClean="0"/>
+              <a:t>consequence</a:t>
+            </a:r>
+            <a:r>
+              <a:rPr lang="fr-FR" baseline="0" dirty="0" smtClean="0"/>
+              <a:t>, </a:t>
+            </a:r>
+            <a:r>
+              <a:rPr lang="fr-FR" baseline="0" dirty="0" smtClean="0"/>
+              <a:t>our objective is to....</a:t>
             </a:r>
             <a:endParaRPr lang="fr-FR" dirty="0"/>
           </a:p>
@@ -1533,7 +1683,67 @@
               <a:rPr lang="fr-FR" dirty="0" smtClean="0">
                 <a:latin typeface="Calibri"/>
               </a:rPr>
-              <a:t>Our approach adress data integration...</a:t>
+              <a:t>In </a:t>
+            </a:r>
+            <a:r>
+              <a:rPr lang="fr-FR" dirty="0" err="1" smtClean="0">
+                <a:latin typeface="Calibri"/>
+              </a:rPr>
+              <a:t>orther</a:t>
+            </a:r>
+            <a:r>
+              <a:rPr lang="fr-FR" dirty="0" smtClean="0">
+                <a:latin typeface="Calibri"/>
+              </a:rPr>
+              <a:t> to </a:t>
+            </a:r>
+            <a:r>
+              <a:rPr lang="fr-FR" dirty="0" err="1" smtClean="0">
+                <a:latin typeface="Calibri"/>
+              </a:rPr>
+              <a:t>achieve</a:t>
+            </a:r>
+            <a:r>
+              <a:rPr lang="fr-FR" dirty="0" smtClean="0">
+                <a:latin typeface="Calibri"/>
+              </a:rPr>
+              <a:t> </a:t>
+            </a:r>
+            <a:r>
+              <a:rPr lang="fr-FR" dirty="0" err="1" smtClean="0">
+                <a:latin typeface="Calibri"/>
+              </a:rPr>
+              <a:t>our</a:t>
+            </a:r>
+            <a:r>
+              <a:rPr lang="fr-FR" baseline="0" dirty="0" smtClean="0">
+                <a:latin typeface="Calibri"/>
+              </a:rPr>
+              <a:t> objective </a:t>
+            </a:r>
+            <a:r>
+              <a:rPr lang="fr-FR" baseline="0" dirty="0" err="1" smtClean="0">
+                <a:latin typeface="Calibri"/>
+              </a:rPr>
+              <a:t>we</a:t>
+            </a:r>
+            <a:r>
+              <a:rPr lang="fr-FR" baseline="0" dirty="0" smtClean="0">
+                <a:latin typeface="Calibri"/>
+              </a:rPr>
+              <a:t> propose to</a:t>
+            </a:r>
+            <a:r>
+              <a:rPr lang="fr-FR" dirty="0" smtClean="0">
+                <a:latin typeface="Calibri"/>
+              </a:rPr>
+              <a:t> </a:t>
+            </a:r>
+            <a:r>
+              <a:rPr lang="fr-FR" dirty="0" smtClean="0">
+                <a:latin typeface="Calibri"/>
+              </a:rPr>
+              <a:t>adress data integration...</a:t>
             </a:r>
           </a:p>
           <a:p>
@@ -1543,7 +1753,7 @@
           </a:p>
           <a:p>
             <a:r>
-              <a:rPr lang="fr-FR" dirty="0" smtClean="0">
+              <a:rPr lang="fr-FR" dirty="0" err="1" smtClean="0">
                 <a:latin typeface="Calibri"/>
               </a:rPr>
               <a:t>Assuming</a:t>
@@ -1552,23 +1762,74 @@
               <a:rPr lang="fr-FR" baseline="0" dirty="0" smtClean="0">
                 <a:latin typeface="Calibri"/>
               </a:rPr>
-              <a:t> the hypotesis that</a:t>
-            </a:r>
-          </a:p>
-          <a:p>
+              <a:t> </a:t>
+            </a:r>
+            <a:r>
+              <a:rPr lang="fr-FR" baseline="0" dirty="0" err="1" smtClean="0">
+                <a:latin typeface="Calibri"/>
+              </a:rPr>
+              <a:t>two</a:t>
+            </a:r>
             <a:r>
               <a:rPr lang="fr-FR" baseline="0" dirty="0" smtClean="0">
                 <a:latin typeface="Calibri"/>
               </a:rPr>
-              <a:t>	the data integration process...</a:t>
-            </a:r>
-          </a:p>
-          <a:p>
+              <a:t> important </a:t>
+            </a:r>
+            <a:r>
+              <a:rPr lang="fr-FR" baseline="0" dirty="0" err="1" smtClean="0">
+                <a:latin typeface="Calibri"/>
+              </a:rPr>
+              <a:t>hypotesis</a:t>
+            </a:r>
             <a:r>
               <a:rPr lang="fr-FR" baseline="0" dirty="0" smtClean="0">
                 <a:latin typeface="Calibri"/>
               </a:rPr>
-              <a:t>	data can be retrieved...</a:t>
+              <a:t> </a:t>
+            </a:r>
+            <a:endParaRPr lang="fr-FR" baseline="0" dirty="0" smtClean="0">
+              <a:latin typeface="Calibri"/>
+            </a:endParaRPr>
+          </a:p>
+          <a:p>
+            <a:r>
+              <a:rPr lang="fr-FR" baseline="0" dirty="0" smtClean="0">
+                <a:latin typeface="Calibri"/>
+              </a:rPr>
+              <a:t>	</a:t>
+            </a:r>
+            <a:r>
+              <a:rPr lang="fr-FR" baseline="0" dirty="0" smtClean="0">
+                <a:latin typeface="Calibri"/>
+              </a:rPr>
+              <a:t>first, the </a:t>
+            </a:r>
+            <a:r>
+              <a:rPr lang="fr-FR" baseline="0" dirty="0" smtClean="0">
+                <a:latin typeface="Calibri"/>
+              </a:rPr>
+              <a:t>data integration process...</a:t>
+            </a:r>
+          </a:p>
+          <a:p>
+            <a:r>
+              <a:rPr lang="fr-FR" baseline="0" dirty="0" smtClean="0">
+                <a:latin typeface="Calibri"/>
+              </a:rPr>
+              <a:t>	</a:t>
+            </a:r>
+            <a:r>
+              <a:rPr lang="fr-FR" baseline="0" dirty="0" smtClean="0">
+                <a:latin typeface="Calibri"/>
+              </a:rPr>
+              <a:t>second data </a:t>
+            </a:r>
+            <a:r>
+              <a:rPr lang="fr-FR" baseline="0" dirty="0" smtClean="0">
+                <a:latin typeface="Calibri"/>
+              </a:rPr>
+              <a:t>can be retrieved...</a:t>
             </a:r>
             <a:endParaRPr lang="es-ES_tradnl" dirty="0" smtClean="0"/>
           </a:p>
@@ -1688,36 +1949,262 @@
               <a:rPr lang="fr-FR" baseline="0" dirty="0" smtClean="0">
                 <a:latin typeface="Calibri"/>
               </a:rPr>
-              <a:t>It consists in 4 steps: selecting candidate ....</a:t>
-            </a:r>
-          </a:p>
-          <a:p>
+              <a:t>It consists in 4 steps: </a:t>
+            </a:r>
+            <a:r>
+              <a:rPr lang="fr-FR" baseline="0" dirty="0" err="1" smtClean="0">
+                <a:latin typeface="Calibri"/>
+              </a:rPr>
+              <a:t>including</a:t>
+            </a:r>
+            <a:r>
+              <a:rPr lang="fr-FR" baseline="0" dirty="0" smtClean="0">
+                <a:latin typeface="Calibri"/>
+              </a:rPr>
+              <a:t> service </a:t>
+            </a:r>
+            <a:r>
+              <a:rPr lang="fr-FR" baseline="0" dirty="0" err="1" smtClean="0">
+                <a:latin typeface="Calibri"/>
+              </a:rPr>
+              <a:t>matching</a:t>
+            </a:r>
+            <a:r>
+              <a:rPr lang="fr-FR" baseline="0" dirty="0" smtClean="0">
+                <a:latin typeface="Calibri"/>
+              </a:rPr>
+              <a:t> and service </a:t>
+            </a:r>
+            <a:r>
+              <a:rPr lang="fr-FR" baseline="0" dirty="0" err="1" smtClean="0">
+                <a:latin typeface="Calibri"/>
+              </a:rPr>
+              <a:t>combination</a:t>
+            </a:r>
+            <a:r>
+              <a:rPr lang="fr-FR" baseline="0" dirty="0" smtClean="0">
+                <a:latin typeface="Calibri"/>
+              </a:rPr>
+              <a:t> </a:t>
+            </a:r>
+            <a:r>
+              <a:rPr lang="fr-FR" baseline="0" dirty="0" err="1" smtClean="0">
+                <a:latin typeface="Calibri"/>
+              </a:rPr>
+              <a:t>ensuring</a:t>
+            </a:r>
+            <a:r>
+              <a:rPr lang="fr-FR" baseline="0" dirty="0" smtClean="0">
+                <a:latin typeface="Calibri"/>
+              </a:rPr>
+              <a:t> </a:t>
+            </a:r>
+            <a:r>
+              <a:rPr lang="fr-FR" baseline="0" dirty="0" err="1" smtClean="0">
+                <a:latin typeface="Calibri"/>
+              </a:rPr>
+              <a:t>that</a:t>
+            </a:r>
+            <a:r>
+              <a:rPr lang="fr-FR" baseline="0" dirty="0" smtClean="0">
+                <a:latin typeface="Calibri"/>
+              </a:rPr>
+              <a:t> </a:t>
+            </a:r>
+            <a:r>
+              <a:rPr lang="fr-FR" baseline="0" dirty="0" err="1" smtClean="0">
+                <a:latin typeface="Calibri"/>
+              </a:rPr>
+              <a:t>they</a:t>
+            </a:r>
+            <a:r>
+              <a:rPr lang="fr-FR" baseline="0" dirty="0" smtClean="0">
+                <a:latin typeface="Calibri"/>
+              </a:rPr>
+              <a:t> </a:t>
+            </a:r>
+            <a:r>
+              <a:rPr lang="fr-FR" baseline="0" dirty="0" err="1" smtClean="0">
+                <a:latin typeface="Calibri"/>
+              </a:rPr>
+              <a:t>fulfill</a:t>
+            </a:r>
+            <a:r>
+              <a:rPr lang="fr-FR" baseline="0" dirty="0" smtClean="0">
+                <a:latin typeface="Calibri"/>
+              </a:rPr>
+              <a:t> </a:t>
+            </a:r>
+            <a:r>
+              <a:rPr lang="fr-FR" baseline="0" dirty="0" err="1" smtClean="0">
+                <a:latin typeface="Calibri"/>
+              </a:rPr>
+              <a:t>quality</a:t>
+            </a:r>
+            <a:r>
+              <a:rPr lang="fr-FR" baseline="0" dirty="0" smtClean="0">
+                <a:latin typeface="Calibri"/>
+              </a:rPr>
+              <a:t> </a:t>
+            </a:r>
+            <a:r>
+              <a:rPr lang="fr-FR" baseline="0" dirty="0" err="1" smtClean="0">
+                <a:latin typeface="Calibri"/>
+              </a:rPr>
+              <a:t>requirements</a:t>
+            </a:r>
+            <a:r>
+              <a:rPr lang="fr-FR" baseline="0" dirty="0" smtClean="0">
+                <a:latin typeface="Calibri"/>
+              </a:rPr>
+              <a:t>.</a:t>
+            </a:r>
             <a:endParaRPr lang="fr-FR" baseline="0" dirty="0" smtClean="0">
               <a:latin typeface="Calibri"/>
             </a:endParaRPr>
           </a:p>
           <a:p>
+            <a:endParaRPr lang="fr-FR" baseline="0" dirty="0" smtClean="0">
+              <a:latin typeface="Calibri"/>
+            </a:endParaRPr>
+          </a:p>
+          <a:p>
             <a:r>
               <a:rPr lang="fr-FR" baseline="0" dirty="0" smtClean="0">
                 <a:latin typeface="Calibri"/>
               </a:rPr>
-              <a:t>It customizes the data providers services look up...</a:t>
-            </a:r>
-          </a:p>
-          <a:p>
+              <a:t>Our </a:t>
+            </a:r>
+            <a:r>
+              <a:rPr lang="fr-FR" baseline="0" dirty="0" err="1" smtClean="0">
+                <a:latin typeface="Calibri"/>
+              </a:rPr>
+              <a:t>algorithm</a:t>
+            </a:r>
             <a:r>
               <a:rPr lang="fr-FR" baseline="0" dirty="0" smtClean="0">
                 <a:latin typeface="Calibri"/>
               </a:rPr>
-              <a:t>Data integration considers...</a:t>
-            </a:r>
-          </a:p>
-          <a:p>
+              <a:t> </a:t>
+            </a:r>
             <a:r>
               <a:rPr lang="fr-FR" baseline="0" dirty="0" smtClean="0">
                 <a:latin typeface="Calibri"/>
               </a:rPr>
-              <a:t>And the requirements and expectations depends...</a:t>
+              <a:t>customizes the data providers services look up...</a:t>
+            </a:r>
+          </a:p>
+          <a:p>
+            <a:r>
+              <a:rPr lang="fr-FR" baseline="0" dirty="0" smtClean="0">
+                <a:latin typeface="Calibri"/>
+              </a:rPr>
+              <a:t>Data integration considers...</a:t>
+            </a:r>
+          </a:p>
+          <a:p>
+            <a:r>
+              <a:rPr lang="fr-FR" baseline="0" dirty="0" smtClean="0">
+                <a:latin typeface="Calibri"/>
+              </a:rPr>
+              <a:t>And the requirements and expectations </a:t>
+            </a:r>
+            <a:r>
+              <a:rPr lang="fr-FR" baseline="0" dirty="0" err="1" smtClean="0">
+                <a:latin typeface="Calibri"/>
+              </a:rPr>
+              <a:t>depends</a:t>
+            </a:r>
+            <a:r>
+              <a:rPr lang="fr-FR" baseline="0" dirty="0" smtClean="0">
+                <a:latin typeface="Calibri"/>
+              </a:rPr>
+              <a:t>...</a:t>
+            </a:r>
+          </a:p>
+          <a:p>
+            <a:endParaRPr lang="fr-FR" baseline="0" dirty="0" smtClean="0">
+              <a:latin typeface="Calibri"/>
+            </a:endParaRPr>
+          </a:p>
+          <a:p>
+            <a:r>
+              <a:rPr lang="fr-FR" baseline="0" dirty="0" smtClean="0">
+                <a:latin typeface="Calibri"/>
+              </a:rPr>
+              <a:t>In the </a:t>
+            </a:r>
+            <a:r>
+              <a:rPr lang="fr-FR" baseline="0" dirty="0" err="1" smtClean="0">
+                <a:latin typeface="Calibri"/>
+              </a:rPr>
+              <a:t>following</a:t>
+            </a:r>
+            <a:r>
+              <a:rPr lang="fr-FR" baseline="0" dirty="0" smtClean="0">
+                <a:latin typeface="Calibri"/>
+              </a:rPr>
+              <a:t> I </a:t>
+            </a:r>
+            <a:r>
+              <a:rPr lang="fr-FR" baseline="0" dirty="0" err="1" smtClean="0">
+                <a:latin typeface="Calibri"/>
+              </a:rPr>
+              <a:t>briefly</a:t>
+            </a:r>
+            <a:r>
+              <a:rPr lang="fr-FR" baseline="0" dirty="0" smtClean="0">
+                <a:latin typeface="Calibri"/>
+              </a:rPr>
+              <a:t> </a:t>
+            </a:r>
+            <a:r>
+              <a:rPr lang="fr-FR" baseline="0" dirty="0" err="1" smtClean="0">
+                <a:latin typeface="Calibri"/>
+              </a:rPr>
+              <a:t>describe</a:t>
+            </a:r>
+            <a:r>
+              <a:rPr lang="fr-FR" baseline="0" dirty="0" smtClean="0">
+                <a:latin typeface="Calibri"/>
+              </a:rPr>
+              <a:t> the </a:t>
+            </a:r>
+            <a:r>
+              <a:rPr lang="fr-FR" baseline="0" dirty="0" err="1" smtClean="0">
+                <a:latin typeface="Calibri"/>
+              </a:rPr>
+              <a:t>general</a:t>
+            </a:r>
+            <a:r>
+              <a:rPr lang="fr-FR" baseline="0" dirty="0" smtClean="0">
+                <a:latin typeface="Calibri"/>
+              </a:rPr>
+              <a:t> </a:t>
+            </a:r>
+            <a:r>
+              <a:rPr lang="fr-FR" baseline="0" dirty="0" err="1" smtClean="0">
+                <a:latin typeface="Calibri"/>
+              </a:rPr>
+              <a:t>principle</a:t>
+            </a:r>
+            <a:r>
+              <a:rPr lang="fr-FR" baseline="0" dirty="0" smtClean="0">
+                <a:latin typeface="Calibri"/>
+              </a:rPr>
+              <a:t> of the </a:t>
+            </a:r>
+            <a:r>
+              <a:rPr lang="fr-FR" baseline="0" dirty="0" err="1" smtClean="0">
+                <a:latin typeface="Calibri"/>
+              </a:rPr>
+              <a:t>steps</a:t>
+            </a:r>
+            <a:r>
+              <a:rPr lang="fr-FR" baseline="0" dirty="0" smtClean="0">
+                <a:latin typeface="Calibri"/>
+              </a:rPr>
+              <a:t>.</a:t>
             </a:r>
             <a:endParaRPr lang="fr-FR" dirty="0">
               <a:latin typeface="Calibri"/>
@@ -3131,66 +3618,102 @@
           <a:lstStyle/>
           <a:p>
             <a:r>
-              <a:rPr lang="en-US" noProof="0" dirty="0"/>
-              <a:t>The agenda of my presentation...</a:t>
+              <a:rPr lang="en-US" noProof="0" dirty="0" smtClean="0"/>
+              <a:t>This</a:t>
+            </a:r>
+            <a:r>
+              <a:rPr lang="en-US" baseline="0" noProof="0" dirty="0" smtClean="0"/>
+              <a:t> presentation is organized in three parts.</a:t>
+            </a:r>
+          </a:p>
+          <a:p>
+            <a:pPr marL="171450" indent="-171450">
+              <a:buFontTx/>
+              <a:buChar char="-"/>
+            </a:pPr>
+            <a:r>
+              <a:rPr lang="en-US" dirty="0" smtClean="0"/>
+              <a:t>I </a:t>
             </a:r>
             <a:r>
               <a:rPr lang="en-US" dirty="0"/>
-              <a:t> I will begin by introducing our </a:t>
+              <a:t>will begin by introducing </a:t>
             </a:r>
             <a:r>
               <a:rPr lang="en-US" dirty="0" smtClean="0"/>
-              <a:t>data </a:t>
+              <a:t>the</a:t>
+            </a:r>
+            <a:r>
+              <a:rPr lang="en-US" baseline="0" dirty="0" smtClean="0"/>
+              <a:t> context of our work which is data integration from services. I will precise our vision about data integration and the general principles of our approach.</a:t>
+            </a:r>
+            <a:endParaRPr lang="en-US" baseline="0" dirty="0"/>
+          </a:p>
+          <a:p>
+            <a:pPr marL="171450" indent="-171450">
+              <a:buFontTx/>
+              <a:buChar char="-"/>
+            </a:pPr>
+            <a:r>
+              <a:rPr lang="en-US" dirty="0" smtClean="0"/>
+              <a:t>Then </a:t>
             </a:r>
             <a:r>
               <a:rPr lang="en-US" dirty="0"/>
-              <a:t>integration </a:t>
+              <a:t>i will </a:t>
             </a:r>
             <a:r>
               <a:rPr lang="en-US" dirty="0" smtClean="0"/>
-              <a:t>context</a:t>
+              <a:t>introduce</a:t>
             </a:r>
             <a:r>
               <a:rPr lang="en-US" baseline="0" dirty="0" smtClean="0"/>
-              <a:t> </a:t>
-            </a:r>
-            <a:endParaRPr lang="en-US" dirty="0"/>
-          </a:p>
-          <a:p>
+              <a:t> our algorithm</a:t>
+            </a:r>
             <a:r>
               <a:rPr lang="en-US" dirty="0" smtClean="0"/>
-              <a:t>then </a:t>
-            </a:r>
-            <a:r>
-              <a:rPr lang="en-US" dirty="0"/>
-              <a:t>i will present the </a:t>
+              <a:t>  query</a:t>
+            </a:r>
+            <a:r>
+              <a:rPr lang="en-US" baseline="0" dirty="0" smtClean="0"/>
+              <a:t> rewriting algorithm named Rhone. </a:t>
+            </a:r>
+          </a:p>
+          <a:p>
+            <a:pPr marL="628650" lvl="1" indent="-171450">
+              <a:buFontTx/>
+              <a:buChar char="-"/>
+            </a:pPr>
+            <a:r>
+              <a:rPr lang="en-US" baseline="0" dirty="0" smtClean="0"/>
+              <a:t>I will explain the general principle focusing on the original aspects illustrated with examples.</a:t>
+            </a:r>
+          </a:p>
+          <a:p>
+            <a:pPr marL="628650" lvl="1" indent="-171450">
+              <a:buFontTx/>
+              <a:buChar char="-"/>
+            </a:pPr>
+            <a:r>
+              <a:rPr lang="en-US" baseline="0" dirty="0" smtClean="0"/>
+              <a:t>I will also talk about the way we designed its experimental validation and which aspects we measured</a:t>
+            </a:r>
+            <a:endParaRPr lang="en-US" dirty="0" smtClean="0"/>
+          </a:p>
+          <a:p>
+            <a:r>
+              <a:rPr lang="en-US" baseline="0" dirty="0" smtClean="0"/>
+              <a:t>	</a:t>
+            </a:r>
+          </a:p>
+          <a:p>
+            <a:r>
+              <a:rPr lang="en-US" baseline="0" dirty="0" smtClean="0"/>
+              <a:t>- Finally I will conclude with </a:t>
             </a:r>
             <a:r>
               <a:rPr lang="en-US" dirty="0" smtClean="0"/>
-              <a:t>Rhone algorithm…</a:t>
-            </a:r>
-          </a:p>
-          <a:p>
-            <a:r>
-              <a:rPr lang="en-US" baseline="0" dirty="0" smtClean="0"/>
-              <a:t>	its principals and examples, and experimental validation</a:t>
-            </a:r>
-          </a:p>
-          <a:p>
-            <a:endParaRPr lang="en-US" baseline="0" dirty="0" smtClean="0"/>
-          </a:p>
-          <a:p>
-            <a:r>
-              <a:rPr lang="en-US" baseline="0" dirty="0" smtClean="0"/>
-              <a:t>And </a:t>
-            </a:r>
-            <a:r>
-              <a:rPr lang="en-US" dirty="0" smtClean="0"/>
-              <a:t>then lesson learned</a:t>
-            </a:r>
-            <a:r>
-              <a:rPr lang="en-US" baseline="0" dirty="0" smtClean="0"/>
-              <a:t> and future works</a:t>
+              <a:t>lessons learned</a:t>
             </a:r>
             <a:endParaRPr lang="en-US" noProof="0" dirty="0"/>
           </a:p>
@@ -4125,6 +4648,139 @@
               </a:rPr>
             </a:br>
             <a:r>
+              <a:rPr lang="en-US" b="1" dirty="0" smtClean="0">
+                <a:solidFill>
+                  <a:schemeClr val="tx1"/>
+                </a:solidFill>
+                <a:latin typeface="Calibri"/>
+              </a:rPr>
+              <a:t>The very classic vision</a:t>
+            </a:r>
+            <a:r>
+              <a:rPr lang="en-US" b="1" baseline="0" dirty="0" smtClean="0">
+                <a:solidFill>
+                  <a:schemeClr val="tx1"/>
+                </a:solidFill>
+                <a:latin typeface="Calibri"/>
+              </a:rPr>
+              <a:t> of data integration is defined as fallows: </a:t>
+            </a:r>
+          </a:p>
+          <a:p>
+            <a:pPr lvl="1" algn="l"/>
+            <a:r>
+              <a:rPr lang="en-US" b="1" baseline="0" dirty="0" smtClean="0">
+                <a:solidFill>
+                  <a:schemeClr val="tx1"/>
+                </a:solidFill>
+                <a:latin typeface="Calibri"/>
+              </a:rPr>
+              <a:t>Given a set of heterogeneous data sources known in advance, provide solutions for answering queries whose answers imply retrieving data from those sources. </a:t>
+            </a:r>
+          </a:p>
+          <a:p>
+            <a:pPr lvl="1" algn="l"/>
+            <a:r>
+              <a:rPr lang="en-US" b="1" baseline="0" dirty="0" smtClean="0">
+                <a:solidFill>
+                  <a:schemeClr val="tx1"/>
+                </a:solidFill>
+                <a:latin typeface="Calibri"/>
+              </a:rPr>
+              <a:t>This problem is well known in the database domain It has been declined into many cases and associated results have been proposed. </a:t>
+            </a:r>
+          </a:p>
+          <a:p>
+            <a:pPr lvl="1" algn="l"/>
+            <a:r>
+              <a:rPr lang="en-US" b="1" baseline="0" dirty="0" smtClean="0">
+                <a:solidFill>
+                  <a:schemeClr val="tx1"/>
+                </a:solidFill>
+                <a:latin typeface="Calibri"/>
+              </a:rPr>
+              <a:t>For example, </a:t>
+            </a:r>
+          </a:p>
+          <a:p>
+            <a:pPr marL="685800" lvl="1" indent="-228600" algn="l">
+              <a:buAutoNum type="arabicPeriod"/>
+            </a:pPr>
+            <a:r>
+              <a:rPr lang="en-US" b="1" baseline="0" dirty="0" smtClean="0">
+                <a:solidFill>
+                  <a:schemeClr val="tx1"/>
+                </a:solidFill>
+                <a:latin typeface="Calibri"/>
+              </a:rPr>
+              <a:t>the case where data sources share or not the same data model leading to works that reasoned about data models equivalence and transformation, </a:t>
+            </a:r>
+          </a:p>
+          <a:p>
+            <a:pPr marL="685800" lvl="1" indent="-228600" algn="l">
+              <a:buAutoNum type="arabicPeriod"/>
+            </a:pPr>
+            <a:endParaRPr lang="en-US" b="1" baseline="0" dirty="0" smtClean="0">
+              <a:solidFill>
+                <a:schemeClr val="tx1"/>
+              </a:solidFill>
+              <a:latin typeface="Calibri"/>
+            </a:endParaRPr>
+          </a:p>
+          <a:p>
+            <a:pPr lvl="1" algn="l"/>
+            <a:r>
+              <a:rPr lang="en-US" b="1" baseline="0" dirty="0" smtClean="0">
+                <a:solidFill>
+                  <a:schemeClr val="tx1"/>
+                </a:solidFill>
+                <a:latin typeface="Calibri"/>
+              </a:rPr>
+              <a:t>2. The case when they export or not schemata describing their content and whether a global schema is derived hiding underlying sources and enabling transparency in query expression. This cases lead to strategies for deriving the global schema concentrating on data structures or including data semantics represented in ontologies</a:t>
+            </a:r>
+          </a:p>
+          <a:p>
+            <a:pPr lvl="1" algn="l"/>
+            <a:endParaRPr lang="en-US" b="1" baseline="0" dirty="0" smtClean="0">
+              <a:solidFill>
+                <a:schemeClr val="tx1"/>
+              </a:solidFill>
+              <a:latin typeface="Calibri"/>
+            </a:endParaRPr>
+          </a:p>
+          <a:p>
+            <a:pPr lvl="1" algn="l"/>
+            <a:r>
+              <a:rPr lang="en-US" b="1" baseline="0" dirty="0" smtClean="0">
+                <a:solidFill>
+                  <a:schemeClr val="tx1"/>
+                </a:solidFill>
+                <a:latin typeface="Calibri"/>
+              </a:rPr>
+              <a:t> 3. The case where only a pivot model and language exist and queries must explicitly express which data from which sources to retrieve.</a:t>
+            </a:r>
+          </a:p>
+          <a:p>
+            <a:pPr lvl="1" algn="l"/>
+            <a:endParaRPr lang="en-US" b="1" dirty="0" smtClean="0">
+              <a:solidFill>
+                <a:schemeClr val="tx1"/>
+              </a:solidFill>
+              <a:latin typeface="Calibri"/>
+            </a:endParaRPr>
+          </a:p>
+          <a:p>
+            <a:pPr lvl="1" algn="l"/>
+            <a:endParaRPr lang="en-US" b="1" dirty="0" smtClean="0">
+              <a:solidFill>
+                <a:schemeClr val="tx1"/>
+              </a:solidFill>
+              <a:latin typeface="Calibri"/>
+            </a:endParaRPr>
+          </a:p>
+          <a:p>
+            <a:pPr lvl="1" algn="l"/>
+            <a:r>
               <a:rPr lang="en-US" b="0" dirty="0" smtClean="0">
                 <a:solidFill>
                   <a:schemeClr val="tx1"/>
@@ -4140,7 +4796,16 @@
                 </a:solidFill>
                 <a:latin typeface="Calibri"/>
               </a:rPr>
-              <a:t> data integration approaches assumes that a query is defined over a global schema and is sent to a mediator. The mediator is responsible to rewrite the query according to the different databases which have their own schemas.</a:t>
+              <a:t> </a:t>
+            </a:r>
+            <a:r>
+              <a:rPr lang="en-US" b="0" baseline="0" dirty="0" smtClean="0">
+                <a:solidFill>
+                  <a:schemeClr val="tx1"/>
+                </a:solidFill>
+                <a:latin typeface="Calibri"/>
+              </a:rPr>
+              <a:t>data integration approaches assumes that a query is defined over a global schema and is sent to a mediator. The mediator is responsible to rewrite the query according to the different databases which have their own schemas.</a:t>
             </a:r>
           </a:p>
           <a:p>
@@ -4333,7 +4998,40 @@
                 <a:latin typeface="Calibri"/>
               </a:rPr>
             </a:br>
-            <a:endParaRPr lang="en-US" b="1" dirty="0">
+            <a:r>
+              <a:rPr lang="en-US" b="1" dirty="0" smtClean="0">
+                <a:solidFill>
+                  <a:schemeClr val="tx1"/>
+                </a:solidFill>
+                <a:latin typeface="Calibri"/>
+              </a:rPr>
+              <a:t>The</a:t>
+            </a:r>
+            <a:r>
+              <a:rPr lang="en-US" b="1" baseline="0" dirty="0" smtClean="0">
+                <a:solidFill>
+                  <a:schemeClr val="tx1"/>
+                </a:solidFill>
+                <a:latin typeface="Calibri"/>
+              </a:rPr>
+              <a:t> emergence of data services changed the data integration problem. Particularly, the hypothesis that assumed that data sources were known in advance.</a:t>
+            </a:r>
+          </a:p>
+          <a:p>
+            <a:pPr lvl="1" algn="just"/>
+            <a:r>
+              <a:rPr lang="en-US" b="1" baseline="0" dirty="0" smtClean="0">
+                <a:solidFill>
+                  <a:schemeClr val="tx1"/>
+                </a:solidFill>
+                <a:latin typeface="Calibri"/>
+              </a:rPr>
+              <a:t>The data integration problem in the presence of services as data providers redefined the problem as follows: Given a query expressing data requirements, look up data services that can fulfill those requirements. The assumptions were that services exported their API and that they can export data under a pivot model that can be used for integrating results.</a:t>
+            </a:r>
+          </a:p>
+          <a:p>
+            <a:pPr lvl="1" algn="just"/>
+            <a:endParaRPr lang="en-US" b="1" baseline="0" dirty="0" smtClean="0">
               <a:solidFill>
                 <a:schemeClr val="tx1"/>
               </a:solidFill>
@@ -4343,40 +5041,18 @@
           <a:p>
             <a:pPr lvl="1" algn="just"/>
             <a:r>
-              <a:rPr lang="en-US" b="1" dirty="0">
+              <a:rPr lang="en-US" b="1" baseline="0" dirty="0" smtClean="0">
+                <a:solidFill>
+                  <a:schemeClr val="tx1"/>
+                </a:solidFill>
                 <a:latin typeface="Calibri"/>
               </a:rPr>
-              <a:t/>
-            </a:r>
-            <a:br>
-              <a:rPr lang="en-US" b="1" dirty="0">
-                <a:latin typeface="Calibri"/>
-              </a:rPr>
-            </a:br>
+              <a:t>The query rewriting problem was redefined as a matching and a service composition problem.</a:t>
+            </a:r>
             <a:endParaRPr lang="en-US" b="1" dirty="0">
-              <a:latin typeface="Calibri"/>
-            </a:endParaRPr>
-          </a:p>
-          <a:p>
-            <a:pPr lvl="1" algn="just"/>
-            <a:endParaRPr lang="en-US" b="1" dirty="0">
-              <a:latin typeface="Calibri"/>
-            </a:endParaRPr>
-          </a:p>
-          <a:p>
-            <a:pPr algn="just"/>
-            <a:r>
-              <a:rPr lang="en-US" dirty="0">
-                <a:latin typeface="Calibri"/>
-              </a:rPr>
-              <a:t/>
-            </a:r>
-            <a:br>
-              <a:rPr lang="en-US" dirty="0">
-                <a:latin typeface="Calibri"/>
-              </a:rPr>
-            </a:br>
-            <a:endParaRPr lang="en-US" dirty="0">
+              <a:solidFill>
+                <a:schemeClr val="tx1"/>
+              </a:solidFill>
               <a:latin typeface="Calibri"/>
             </a:endParaRPr>
           </a:p>
@@ -4640,26 +5316,41 @@
               <a:rPr lang="en-US" dirty="0" smtClean="0">
                 <a:latin typeface="Calibri"/>
               </a:rPr>
-              <a:t>In</a:t>
+              <a:t>Consider the following example consisting of services that provide biological</a:t>
             </a:r>
             <a:r>
               <a:rPr lang="en-US" baseline="0" dirty="0" smtClean="0">
                 <a:latin typeface="Calibri"/>
               </a:rPr>
-              <a:t> our vision, data services are deployed in clouds.</a:t>
-            </a:r>
-          </a:p>
-          <a:p>
+              <a:t> data to Health professionals</a:t>
+            </a:r>
             <a:endParaRPr lang="en-US" baseline="0" dirty="0" smtClean="0">
               <a:latin typeface="Calibri"/>
             </a:endParaRPr>
           </a:p>
           <a:p>
+            <a:endParaRPr lang="en-US" baseline="0" dirty="0" smtClean="0">
+              <a:latin typeface="Calibri"/>
+            </a:endParaRPr>
+          </a:p>
+          <a:p>
+            <a:r>
+              <a:rPr lang="is-IS" baseline="0" dirty="0" smtClean="0">
+                <a:latin typeface="Calibri"/>
+              </a:rPr>
+              <a:t>… </a:t>
+            </a:r>
             <a:r>
               <a:rPr lang="en-US" baseline="0" dirty="0" smtClean="0">
                 <a:latin typeface="Calibri"/>
               </a:rPr>
-              <a:t>For instance, data provider A provides information about infected </a:t>
+              <a:t>data </a:t>
+            </a:r>
+            <a:r>
+              <a:rPr lang="en-US" baseline="0" dirty="0" smtClean="0">
+                <a:latin typeface="Calibri"/>
+              </a:rPr>
+              <a:t>provider A provides information about infected </a:t>
             </a:r>
             <a:r>
               <a:rPr lang="en-US" baseline="0" dirty="0" smtClean="0">
@@ -4745,8 +5436,109 @@
               <a:rPr lang="en-US" baseline="0" dirty="0" smtClean="0">
                 <a:latin typeface="+mn-lt"/>
               </a:rPr>
-              <a:t>Each provider has its own SLA specifying what a consumer can expect from its services… for instance, let us consider that each SLA defines the availability and the price per call for a service</a:t>
-            </a:r>
+              <a:t>Besides each </a:t>
+            </a:r>
+            <a:r>
+              <a:rPr lang="en-US" baseline="0" dirty="0" smtClean="0">
+                <a:latin typeface="+mn-lt"/>
+              </a:rPr>
+              <a:t>provider </a:t>
+            </a:r>
+            <a:r>
+              <a:rPr lang="en-US" baseline="0" dirty="0" smtClean="0">
+                <a:latin typeface="+mn-lt"/>
+              </a:rPr>
+              <a:t>exports </a:t>
+            </a:r>
+            <a:r>
+              <a:rPr lang="en-US" baseline="0" dirty="0" smtClean="0">
+                <a:latin typeface="+mn-lt"/>
+              </a:rPr>
+              <a:t>its own </a:t>
+            </a:r>
+            <a:r>
+              <a:rPr lang="en-US" baseline="0" dirty="0" smtClean="0">
+                <a:latin typeface="+mn-lt"/>
+              </a:rPr>
+              <a:t>Service Level Agreement </a:t>
+            </a:r>
+            <a:r>
+              <a:rPr lang="en-US" baseline="0" dirty="0" smtClean="0">
+                <a:latin typeface="+mn-lt"/>
+              </a:rPr>
+              <a:t>specifying what a consumer can expect from its </a:t>
+            </a:r>
+            <a:r>
+              <a:rPr lang="en-US" baseline="0" dirty="0" smtClean="0">
+                <a:latin typeface="+mn-lt"/>
+              </a:rPr>
+              <a:t>service… </a:t>
+            </a:r>
+          </a:p>
+          <a:p>
+            <a:pPr marL="0" marR="0" indent="0" algn="l" defTabSz="457200" rtl="0" eaLnBrk="1" fontAlgn="auto" latinLnBrk="0" hangingPunct="1">
+              <a:lnSpc>
+                <a:spcPct val="100000"/>
+              </a:lnSpc>
+              <a:spcBef>
+                <a:spcPts val="0"/>
+              </a:spcBef>
+              <a:spcAft>
+                <a:spcPts val="0"/>
+              </a:spcAft>
+              <a:buClrTx/>
+              <a:buSzTx/>
+              <a:buFontTx/>
+              <a:buNone/>
+              <a:tabLst/>
+              <a:defRPr/>
+            </a:pPr>
+            <a:r>
+              <a:rPr lang="en-US" baseline="0" dirty="0" smtClean="0">
+                <a:latin typeface="+mn-lt"/>
+              </a:rPr>
+              <a:t>In this example SLA’s define </a:t>
+            </a:r>
+            <a:r>
+              <a:rPr lang="en-US" baseline="0" dirty="0" smtClean="0">
+                <a:latin typeface="+mn-lt"/>
+              </a:rPr>
+              <a:t>the availability and the price per call for </a:t>
+            </a:r>
+            <a:r>
+              <a:rPr lang="en-US" baseline="0" dirty="0" smtClean="0">
+                <a:latin typeface="+mn-lt"/>
+              </a:rPr>
+              <a:t>each service. Thus data provider A is available 97% of the time and the price per call costs 0,15</a:t>
+            </a:r>
+          </a:p>
+          <a:p>
+            <a:pPr marL="0" marR="0" indent="0" algn="l" defTabSz="457200" rtl="0" eaLnBrk="1" fontAlgn="auto" latinLnBrk="0" hangingPunct="1">
+              <a:lnSpc>
+                <a:spcPct val="100000"/>
+              </a:lnSpc>
+              <a:spcBef>
+                <a:spcPts val="0"/>
+              </a:spcBef>
+              <a:spcAft>
+                <a:spcPts val="0"/>
+              </a:spcAft>
+              <a:buClrTx/>
+              <a:buSzTx/>
+              <a:buFontTx/>
+              <a:buNone/>
+              <a:tabLst/>
+              <a:defRPr/>
+            </a:pPr>
+            <a:r>
+              <a:rPr lang="en-US" baseline="0" dirty="0" smtClean="0">
+                <a:latin typeface="+mn-lt"/>
+              </a:rPr>
+              <a:t>Whereas data provider C is 99,9% of the time available and the price per call is 0,5 cents</a:t>
+            </a:r>
+            <a:endParaRPr lang="en-US" baseline="0" dirty="0" smtClean="0">
+              <a:latin typeface="+mn-lt"/>
+            </a:endParaRPr>
           </a:p>
           <a:p>
             <a:r>
@@ -4853,28 +5645,26 @@
               <a:rPr lang="en-US" dirty="0" smtClean="0">
                 <a:latin typeface="Calibri"/>
               </a:rPr>
-              <a:t>A user willing to integrate</a:t>
+              <a:t>A </a:t>
+            </a:r>
+            <a:r>
+              <a:rPr lang="en-US" dirty="0" smtClean="0">
+                <a:latin typeface="Calibri"/>
+              </a:rPr>
+              <a:t>data</a:t>
             </a:r>
             <a:r>
               <a:rPr lang="en-US" baseline="0" dirty="0" smtClean="0">
                 <a:latin typeface="Calibri"/>
               </a:rPr>
-              <a:t> data defines his query according to his needs and also associate to it his requirements and preferences.</a:t>
-            </a:r>
-          </a:p>
-          <a:p>
+              <a:t> consumer could define her data requirements with associated restrictions as follows</a:t>
+            </a:r>
             <a:endParaRPr lang="en-US" baseline="0" dirty="0" smtClean="0">
               <a:latin typeface="Calibri"/>
             </a:endParaRPr>
           </a:p>
           <a:p>
             <a:r>
-              <a:rPr lang="en-US" baseline="0" dirty="0" smtClean="0">
-                <a:latin typeface="Calibri"/>
-              </a:rPr>
-              <a:t>For instance, a user wants to retrieve personal….</a:t>
-            </a:r>
-            <a:r>
               <a:rPr lang="en-US" dirty="0">
                 <a:latin typeface="Calibri"/>
               </a:rPr>
@@ -4886,6 +5676,300 @@
               </a:rPr>
             </a:br>
             <a:endParaRPr lang="en-US" baseline="0" noProof="0" dirty="0"/>
+          </a:p>
+          <a:p>
+            <a:pPr marL="0" marR="0" indent="0" algn="l" defTabSz="457200" rtl="0" eaLnBrk="1" fontAlgn="auto" latinLnBrk="0" hangingPunct="1">
+              <a:lnSpc>
+                <a:spcPct val="100000"/>
+              </a:lnSpc>
+              <a:spcBef>
+                <a:spcPts val="0"/>
+              </a:spcBef>
+              <a:spcAft>
+                <a:spcPts val="0"/>
+              </a:spcAft>
+              <a:buClrTx/>
+              <a:buSzTx/>
+              <a:buFontTx/>
+              <a:buNone/>
+              <a:tabLst/>
+              <a:defRPr/>
+            </a:pPr>
+            <a:r>
+              <a:rPr lang="en-US" sz="1200" i="1" dirty="0" smtClean="0">
+                <a:solidFill>
+                  <a:schemeClr val="bg1"/>
+                </a:solidFill>
+              </a:rPr>
+              <a:t>Retrieve personal and DNA information from patients that were infected by flu, </a:t>
+            </a:r>
+            <a:r>
+              <a:rPr lang="en-US" sz="1200" i="1" dirty="0" smtClean="0">
+                <a:solidFill>
+                  <a:schemeClr val="bg1"/>
+                </a:solidFill>
+                <a:effectLst>
+                  <a:outerShdw blurRad="38100" dist="38100" dir="2700000" algn="tl">
+                    <a:srgbClr val="000000">
+                      <a:alpha val="43137"/>
+                    </a:srgbClr>
+                  </a:outerShdw>
+                </a:effectLst>
+              </a:rPr>
+              <a:t>using services </a:t>
+            </a:r>
+          </a:p>
+          <a:p>
+            <a:pPr marL="0" marR="0" indent="0" algn="l" defTabSz="457200" rtl="0" eaLnBrk="1" fontAlgn="auto" latinLnBrk="0" hangingPunct="1">
+              <a:lnSpc>
+                <a:spcPct val="100000"/>
+              </a:lnSpc>
+              <a:spcBef>
+                <a:spcPts val="0"/>
+              </a:spcBef>
+              <a:spcAft>
+                <a:spcPts val="0"/>
+              </a:spcAft>
+              <a:buClrTx/>
+              <a:buSzTx/>
+              <a:buFontTx/>
+              <a:buNone/>
+              <a:tabLst/>
+              <a:defRPr/>
+            </a:pPr>
+            <a:r>
+              <a:rPr lang="en-US" sz="1200" i="1" dirty="0" smtClean="0">
+                <a:solidFill>
+                  <a:schemeClr val="bg1"/>
+                </a:solidFill>
+                <a:effectLst>
+                  <a:outerShdw blurRad="38100" dist="38100" dir="2700000" algn="tl">
+                    <a:srgbClr val="000000">
+                      <a:alpha val="43137"/>
+                    </a:srgbClr>
+                  </a:outerShdw>
+                </a:effectLst>
+              </a:rPr>
+              <a:t>with </a:t>
+            </a:r>
+            <a:r>
+              <a:rPr lang="en-US" sz="1200" b="1" i="1" dirty="0" smtClean="0">
+                <a:solidFill>
+                  <a:schemeClr val="tx2">
+                    <a:lumMod val="40000"/>
+                    <a:lumOff val="60000"/>
+                  </a:schemeClr>
+                </a:solidFill>
+                <a:effectLst>
+                  <a:outerShdw blurRad="38100" dist="38100" dir="2700000" algn="tl">
+                    <a:srgbClr val="000000">
+                      <a:alpha val="43137"/>
+                    </a:srgbClr>
+                  </a:outerShdw>
+                </a:effectLst>
+              </a:rPr>
+              <a:t>availability higher than 98%</a:t>
+            </a:r>
+            <a:r>
+              <a:rPr lang="en-US" sz="1200" i="1" dirty="0" smtClean="0">
+                <a:solidFill>
+                  <a:schemeClr val="bg1"/>
+                </a:solidFill>
+                <a:effectLst>
+                  <a:outerShdw blurRad="38100" dist="38100" dir="2700000" algn="tl">
+                    <a:srgbClr val="000000">
+                      <a:alpha val="43137"/>
+                    </a:srgbClr>
+                  </a:outerShdw>
+                </a:effectLst>
+              </a:rPr>
+              <a:t>, </a:t>
+            </a:r>
+            <a:r>
+              <a:rPr lang="en-US" sz="1200" b="1" i="1" dirty="0" smtClean="0">
+                <a:solidFill>
+                  <a:schemeClr val="accent3">
+                    <a:lumMod val="60000"/>
+                    <a:lumOff val="40000"/>
+                  </a:schemeClr>
+                </a:solidFill>
+                <a:effectLst>
+                  <a:outerShdw blurRad="38100" dist="38100" dir="2700000" algn="tl">
+                    <a:srgbClr val="000000">
+                      <a:alpha val="43137"/>
+                    </a:srgbClr>
+                  </a:outerShdw>
+                </a:effectLst>
+              </a:rPr>
+              <a:t>price per call less than 0.2$ </a:t>
+            </a:r>
+            <a:r>
+              <a:rPr lang="en-US" sz="1200" i="1" dirty="0" smtClean="0">
+                <a:solidFill>
+                  <a:schemeClr val="bg1"/>
+                </a:solidFill>
+                <a:effectLst>
+                  <a:outerShdw blurRad="38100" dist="38100" dir="2700000" algn="tl">
+                    <a:srgbClr val="000000">
+                      <a:alpha val="43137"/>
+                    </a:srgbClr>
+                  </a:outerShdw>
+                </a:effectLst>
+              </a:rPr>
+              <a:t>&amp; </a:t>
+            </a:r>
+            <a:r>
+              <a:rPr lang="en-US" sz="1200" b="1" i="1" dirty="0" smtClean="0">
+                <a:solidFill>
+                  <a:schemeClr val="accent5">
+                    <a:lumMod val="40000"/>
+                    <a:lumOff val="60000"/>
+                  </a:schemeClr>
+                </a:solidFill>
+                <a:effectLst>
+                  <a:outerShdw blurRad="38100" dist="38100" dir="2700000" algn="tl">
+                    <a:srgbClr val="000000">
+                      <a:alpha val="43137"/>
+                    </a:srgbClr>
+                  </a:outerShdw>
+                </a:effectLst>
+              </a:rPr>
+              <a:t>total cost less than 5$</a:t>
+            </a:r>
+          </a:p>
+          <a:p>
+            <a:pPr marL="0" marR="0" indent="0" algn="l" defTabSz="457200" rtl="0" eaLnBrk="1" fontAlgn="auto" latinLnBrk="0" hangingPunct="1">
+              <a:lnSpc>
+                <a:spcPct val="100000"/>
+              </a:lnSpc>
+              <a:spcBef>
+                <a:spcPts val="0"/>
+              </a:spcBef>
+              <a:spcAft>
+                <a:spcPts val="0"/>
+              </a:spcAft>
+              <a:buClrTx/>
+              <a:buSzTx/>
+              <a:buFontTx/>
+              <a:buNone/>
+              <a:tabLst/>
+              <a:defRPr/>
+            </a:pPr>
+            <a:endParaRPr lang="en-US" sz="1200" b="1" i="1" dirty="0" smtClean="0">
+              <a:solidFill>
+                <a:schemeClr val="accent5">
+                  <a:lumMod val="40000"/>
+                  <a:lumOff val="60000"/>
+                </a:schemeClr>
+              </a:solidFill>
+              <a:effectLst>
+                <a:outerShdw blurRad="38100" dist="38100" dir="2700000" algn="tl">
+                  <a:srgbClr val="000000">
+                    <a:alpha val="43137"/>
+                  </a:srgbClr>
+                </a:outerShdw>
+              </a:effectLst>
+            </a:endParaRPr>
+          </a:p>
+          <a:p>
+            <a:pPr marL="0" marR="0" indent="0" algn="l" defTabSz="457200" rtl="0" eaLnBrk="1" fontAlgn="auto" latinLnBrk="0" hangingPunct="1">
+              <a:lnSpc>
+                <a:spcPct val="100000"/>
+              </a:lnSpc>
+              <a:spcBef>
+                <a:spcPts val="0"/>
+              </a:spcBef>
+              <a:spcAft>
+                <a:spcPts val="0"/>
+              </a:spcAft>
+              <a:buClrTx/>
+              <a:buSzTx/>
+              <a:buFontTx/>
+              <a:buNone/>
+              <a:tabLst/>
+              <a:defRPr/>
+            </a:pPr>
+            <a:r>
+              <a:rPr lang="en-US" sz="1200" b="1" i="1" dirty="0" smtClean="0">
+                <a:solidFill>
+                  <a:schemeClr val="accent5">
+                    <a:lumMod val="40000"/>
+                    <a:lumOff val="60000"/>
+                  </a:schemeClr>
+                </a:solidFill>
+                <a:effectLst>
+                  <a:outerShdw blurRad="38100" dist="38100" dir="2700000" algn="tl">
+                    <a:srgbClr val="000000">
+                      <a:alpha val="43137"/>
+                    </a:srgbClr>
+                  </a:outerShdw>
+                </a:effectLst>
+              </a:rPr>
+              <a:t>In order to express</a:t>
+            </a:r>
+            <a:r>
+              <a:rPr lang="en-US" sz="1200" b="1" i="1" baseline="0" dirty="0" smtClean="0">
+                <a:solidFill>
+                  <a:schemeClr val="accent5">
+                    <a:lumMod val="40000"/>
+                    <a:lumOff val="60000"/>
+                  </a:schemeClr>
+                </a:solidFill>
+                <a:effectLst>
+                  <a:outerShdw blurRad="38100" dist="38100" dir="2700000" algn="tl">
+                    <a:srgbClr val="000000">
+                      <a:alpha val="43137"/>
+                    </a:srgbClr>
+                  </a:outerShdw>
+                </a:effectLst>
+              </a:rPr>
+              <a:t> the query the consumer has an abstract view of services and this abstract view has associated a list of possible</a:t>
+            </a:r>
+          </a:p>
+          <a:p>
+            <a:pPr marL="0" marR="0" indent="0" algn="l" defTabSz="457200" rtl="0" eaLnBrk="1" fontAlgn="auto" latinLnBrk="0" hangingPunct="1">
+              <a:lnSpc>
+                <a:spcPct val="100000"/>
+              </a:lnSpc>
+              <a:spcBef>
+                <a:spcPts val="0"/>
+              </a:spcBef>
+              <a:spcAft>
+                <a:spcPts val="0"/>
+              </a:spcAft>
+              <a:buClrTx/>
+              <a:buSzTx/>
+              <a:buFontTx/>
+              <a:buNone/>
+              <a:tabLst/>
+              <a:defRPr/>
+            </a:pPr>
+            <a:r>
+              <a:rPr lang="en-US" sz="1200" b="1" i="1" baseline="0" dirty="0" smtClean="0">
+                <a:solidFill>
+                  <a:schemeClr val="accent5">
+                    <a:lumMod val="40000"/>
+                    <a:lumOff val="60000"/>
+                  </a:schemeClr>
+                </a:solidFill>
+                <a:effectLst>
+                  <a:outerShdw blurRad="38100" dist="38100" dir="2700000" algn="tl">
+                    <a:srgbClr val="000000">
+                      <a:alpha val="43137"/>
+                    </a:srgbClr>
+                  </a:outerShdw>
+                </a:effectLst>
+              </a:rPr>
+              <a:t>Concrete services definitions that the consumer does not need to know. Particularly because there can be a lot and it could be painful to manually choose them</a:t>
+            </a:r>
+            <a:endParaRPr lang="en-US" sz="1200" b="1" i="1" dirty="0" smtClean="0">
+              <a:solidFill>
+                <a:schemeClr val="accent5">
+                  <a:lumMod val="40000"/>
+                  <a:lumOff val="60000"/>
+                </a:schemeClr>
+              </a:solidFill>
+            </a:endParaRPr>
           </a:p>
           <a:p>
             <a:r>
@@ -4992,7 +6076,7 @@
               <a:rPr lang="en-US" baseline="0" noProof="0" dirty="0" smtClean="0">
                 <a:latin typeface="Calibri"/>
               </a:rPr>
-              <a:t>To perform the integration in this context, we are assuming that concrete data services are defined in term of abstract services and quality features extracted from SLAs</a:t>
+              <a:t>We use the following declarative expressions for formally describing this abstract – concrete services association</a:t>
             </a:r>
           </a:p>
           <a:p>
@@ -5005,7 +6089,13 @@
               <a:rPr lang="en-US" baseline="0" noProof="0" dirty="0" smtClean="0">
                 <a:latin typeface="Calibri"/>
               </a:rPr>
-              <a:t>Abstract services are the small piece of function executed by a service, for example, given these 7 concrete services, the abstract service A1 returns infected patients given a disease, A2 returns the DNA information and A3 the patient personal information… between brackets we can also see the quality features associated to each concrete service</a:t>
+              <a:t>In our example, </a:t>
+            </a:r>
+            <a:r>
+              <a:rPr lang="en-US" baseline="0" noProof="0" dirty="0" smtClean="0">
+                <a:latin typeface="Calibri"/>
+              </a:rPr>
+              <a:t>given these 7 concrete services, the abstract service A1 returns infected patients given a disease, A2 returns the DNA information and A3 the patient personal information… between brackets we can also see the quality features associated to each concrete service</a:t>
             </a:r>
             <a:endParaRPr lang="en-US" baseline="0" noProof="0" dirty="0"/>
           </a:p>
@@ -5112,7 +6202,11 @@
           <a:p>
             <a:r>
               <a:rPr lang="en-US" baseline="0" noProof="0" dirty="0" smtClean="0"/>
-              <a:t>Like concrete services, the query can be also expressed in terms of abstract services and it user preferences can be associated to them</a:t>
+              <a:t>Similarly, </a:t>
+            </a:r>
+            <a:r>
+              <a:rPr lang="en-US" baseline="0" noProof="0" dirty="0" smtClean="0"/>
+              <a:t>the query can be also expressed in terms of abstract services and it user preferences can be associated to them</a:t>
             </a:r>
           </a:p>
           <a:p>
@@ -5121,9 +6215,25 @@
           <a:p>
             <a:r>
               <a:rPr lang="en-US" baseline="0" noProof="0" dirty="0" smtClean="0"/>
-              <a:t>For instance, our previous query example can be expressed in the following manner</a:t>
-            </a:r>
-            <a:endParaRPr lang="en-US" baseline="0" noProof="0" dirty="0"/>
+              <a:t>For instance, our previous query example can be expressed in the following </a:t>
+            </a:r>
+            <a:r>
+              <a:rPr lang="en-US" baseline="0" noProof="0" dirty="0" err="1" smtClean="0"/>
+              <a:t>datalog</a:t>
+            </a:r>
+            <a:r>
+              <a:rPr lang="en-US" baseline="0" noProof="0" dirty="0" smtClean="0"/>
+              <a:t> like manner:</a:t>
+            </a:r>
+          </a:p>
+          <a:p>
+            <a:endParaRPr lang="en-US" baseline="0" noProof="0" dirty="0" smtClean="0"/>
+          </a:p>
+          <a:p>
+            <a:r>
+              <a:rPr lang="en-US" b="1" baseline="0" noProof="0" dirty="0" smtClean="0"/>
+              <a:t>(Here write explanation about the formalism)</a:t>
+            </a:r>
           </a:p>
         </p:txBody>
       </p:sp>
@@ -5389,7 +6499,7 @@
           <a:p>
             <a:fld id="{68C2560D-EC28-3B41-86E8-18F1CE0113B4}" type="datetimeFigureOut">
               <a:rPr lang="en-US" smtClean="0"/>
-              <a:t>8/20/2016</a:t>
+              <a:t>8/22/16</a:t>
             </a:fld>
             <a:endParaRPr lang="en-US"/>
           </a:p>
@@ -5431,7 +6541,7 @@
           <a:p>
             <a:fld id="{2066355A-084C-D24E-9AD2-7E4FC41EA627}" type="slidenum">
               <a:rPr lang="en-US" smtClean="0"/>
-              <a:t>‹nº›</a:t>
+              <a:t>‹#›</a:t>
             </a:fld>
             <a:endParaRPr lang="en-US"/>
           </a:p>
@@ -5597,7 +6707,7 @@
           <a:p>
             <a:fld id="{68C2560D-EC28-3B41-86E8-18F1CE0113B4}" type="datetimeFigureOut">
               <a:rPr lang="en-US" smtClean="0"/>
-              <a:t>8/20/2016</a:t>
+              <a:t>8/22/16</a:t>
             </a:fld>
             <a:endParaRPr lang="en-US"/>
           </a:p>
@@ -5639,7 +6749,7 @@
           <a:p>
             <a:fld id="{2066355A-084C-D24E-9AD2-7E4FC41EA627}" type="slidenum">
               <a:rPr lang="en-US" smtClean="0"/>
-              <a:t>‹nº›</a:t>
+              <a:t>‹#›</a:t>
             </a:fld>
             <a:endParaRPr lang="en-US"/>
           </a:p>
@@ -5853,7 +6963,7 @@
           <a:p>
             <a:fld id="{68C2560D-EC28-3B41-86E8-18F1CE0113B4}" type="datetimeFigureOut">
               <a:rPr lang="en-US" smtClean="0"/>
-              <a:t>8/20/2016</a:t>
+              <a:t>8/22/16</a:t>
             </a:fld>
             <a:endParaRPr lang="en-US"/>
           </a:p>
@@ -5895,7 +7005,7 @@
           <a:p>
             <a:fld id="{2066355A-084C-D24E-9AD2-7E4FC41EA627}" type="slidenum">
               <a:rPr lang="en-US" smtClean="0"/>
-              <a:t>‹nº›</a:t>
+              <a:t>‹#›</a:t>
             </a:fld>
             <a:endParaRPr lang="en-US"/>
           </a:p>
@@ -6027,7 +7137,7 @@
           <a:p>
             <a:fld id="{68C2560D-EC28-3B41-86E8-18F1CE0113B4}" type="datetimeFigureOut">
               <a:rPr lang="en-US" smtClean="0"/>
-              <a:t>8/20/2016</a:t>
+              <a:t>8/22/16</a:t>
             </a:fld>
             <a:endParaRPr lang="en-US"/>
           </a:p>
@@ -6069,7 +7179,7 @@
           <a:p>
             <a:fld id="{2066355A-084C-D24E-9AD2-7E4FC41EA627}" type="slidenum">
               <a:rPr lang="en-US" smtClean="0"/>
-              <a:t>‹nº›</a:t>
+              <a:t>‹#›</a:t>
             </a:fld>
             <a:endParaRPr lang="en-US"/>
           </a:p>
@@ -6370,7 +7480,7 @@
           <a:p>
             <a:fld id="{68C2560D-EC28-3B41-86E8-18F1CE0113B4}" type="datetimeFigureOut">
               <a:rPr lang="en-US" smtClean="0"/>
-              <a:t>8/20/2016</a:t>
+              <a:t>8/22/16</a:t>
             </a:fld>
             <a:endParaRPr lang="en-US"/>
           </a:p>
@@ -6412,7 +7522,7 @@
           <a:p>
             <a:fld id="{2066355A-084C-D24E-9AD2-7E4FC41EA627}" type="slidenum">
               <a:rPr lang="en-US" smtClean="0"/>
-              <a:t>‹nº›</a:t>
+              <a:t>‹#›</a:t>
             </a:fld>
             <a:endParaRPr lang="en-US"/>
           </a:p>
@@ -6645,7 +7755,7 @@
           <a:p>
             <a:fld id="{68C2560D-EC28-3B41-86E8-18F1CE0113B4}" type="datetimeFigureOut">
               <a:rPr lang="en-US" smtClean="0"/>
-              <a:t>8/20/2016</a:t>
+              <a:t>8/22/16</a:t>
             </a:fld>
             <a:endParaRPr lang="en-US"/>
           </a:p>
@@ -6687,7 +7797,7 @@
           <a:p>
             <a:fld id="{2066355A-084C-D24E-9AD2-7E4FC41EA627}" type="slidenum">
               <a:rPr lang="en-US" smtClean="0"/>
-              <a:t>‹nº›</a:t>
+              <a:t>‹#›</a:t>
             </a:fld>
             <a:endParaRPr lang="en-US"/>
           </a:p>
@@ -7024,7 +8134,7 @@
           <a:p>
             <a:fld id="{68C2560D-EC28-3B41-86E8-18F1CE0113B4}" type="datetimeFigureOut">
               <a:rPr lang="en-US" smtClean="0"/>
-              <a:t>8/20/2016</a:t>
+              <a:t>8/22/16</a:t>
             </a:fld>
             <a:endParaRPr lang="en-US"/>
           </a:p>
@@ -7066,7 +8176,7 @@
           <a:p>
             <a:fld id="{2066355A-084C-D24E-9AD2-7E4FC41EA627}" type="slidenum">
               <a:rPr lang="en-US" smtClean="0"/>
-              <a:t>‹nº›</a:t>
+              <a:t>‹#›</a:t>
             </a:fld>
             <a:endParaRPr lang="en-US"/>
           </a:p>
@@ -7142,7 +8252,7 @@
           <a:p>
             <a:fld id="{68C2560D-EC28-3B41-86E8-18F1CE0113B4}" type="datetimeFigureOut">
               <a:rPr lang="en-US" smtClean="0"/>
-              <a:t>8/20/2016</a:t>
+              <a:t>8/22/16</a:t>
             </a:fld>
             <a:endParaRPr lang="en-US"/>
           </a:p>
@@ -7184,7 +8294,7 @@
           <a:p>
             <a:fld id="{2066355A-084C-D24E-9AD2-7E4FC41EA627}" type="slidenum">
               <a:rPr lang="en-US" smtClean="0"/>
-              <a:t>‹nº›</a:t>
+              <a:t>‹#›</a:t>
             </a:fld>
             <a:endParaRPr lang="en-US"/>
           </a:p>
@@ -7313,7 +8423,7 @@
           <a:p>
             <a:fld id="{68C2560D-EC28-3B41-86E8-18F1CE0113B4}" type="datetimeFigureOut">
               <a:rPr lang="en-US" smtClean="0"/>
-              <a:t>8/20/2016</a:t>
+              <a:t>8/22/16</a:t>
             </a:fld>
             <a:endParaRPr lang="en-US"/>
           </a:p>
@@ -7363,7 +8473,7 @@
           <a:p>
             <a:fld id="{2066355A-084C-D24E-9AD2-7E4FC41EA627}" type="slidenum">
               <a:rPr lang="en-US" smtClean="0"/>
-              <a:t>‹nº›</a:t>
+              <a:t>‹#›</a:t>
             </a:fld>
             <a:endParaRPr lang="en-US"/>
           </a:p>
@@ -7667,7 +8777,7 @@
           <a:p>
             <a:fld id="{68C2560D-EC28-3B41-86E8-18F1CE0113B4}" type="datetimeFigureOut">
               <a:rPr lang="en-US" smtClean="0"/>
-              <a:t>8/20/2016</a:t>
+              <a:t>8/22/16</a:t>
             </a:fld>
             <a:endParaRPr lang="en-US"/>
           </a:p>
@@ -7730,7 +8840,7 @@
           <a:p>
             <a:fld id="{2066355A-084C-D24E-9AD2-7E4FC41EA627}" type="slidenum">
               <a:rPr lang="en-US" smtClean="0"/>
-              <a:t>‹nº›</a:t>
+              <a:t>‹#›</a:t>
             </a:fld>
             <a:endParaRPr lang="en-US"/>
           </a:p>
@@ -8049,7 +9159,7 @@
           <a:p>
             <a:fld id="{68C2560D-EC28-3B41-86E8-18F1CE0113B4}" type="datetimeFigureOut">
               <a:rPr lang="en-US" smtClean="0"/>
-              <a:t>8/20/2016</a:t>
+              <a:t>8/22/16</a:t>
             </a:fld>
             <a:endParaRPr lang="en-US"/>
           </a:p>
@@ -8091,7 +9201,7 @@
           <a:p>
             <a:fld id="{2066355A-084C-D24E-9AD2-7E4FC41EA627}" type="slidenum">
               <a:rPr lang="en-US" smtClean="0"/>
-              <a:t>‹nº›</a:t>
+              <a:t>‹#›</a:t>
             </a:fld>
             <a:endParaRPr lang="en-US"/>
           </a:p>
@@ -8336,7 +9446,7 @@
           <a:p>
             <a:fld id="{68C2560D-EC28-3B41-86E8-18F1CE0113B4}" type="datetimeFigureOut">
               <a:rPr lang="en-US" smtClean="0"/>
-              <a:t>8/20/2016</a:t>
+              <a:t>8/22/16</a:t>
             </a:fld>
             <a:endParaRPr lang="en-US"/>
           </a:p>
@@ -8410,7 +9520,7 @@
           <a:p>
             <a:fld id="{2066355A-084C-D24E-9AD2-7E4FC41EA627}" type="slidenum">
               <a:rPr lang="en-US" smtClean="0"/>
-              <a:t>‹nº›</a:t>
+              <a:t>‹#›</a:t>
             </a:fld>
             <a:endParaRPr lang="en-US"/>
           </a:p>
@@ -29245,7 +30355,15 @@
                   <a:schemeClr val="tx1"/>
                 </a:solidFill>
               </a:rPr>
-              <a:t>Data integration from services: motivation and objective</a:t>
+              <a:t>Data integration from </a:t>
+            </a:r>
+            <a:r>
+              <a:rPr lang="en-US" sz="1725" b="1" dirty="0" smtClean="0">
+                <a:solidFill>
+                  <a:schemeClr val="tx1"/>
+                </a:solidFill>
+              </a:rPr>
+              <a:t>services</a:t>
             </a:r>
           </a:p>
           <a:p>
@@ -29257,16 +30375,12 @@
               <a:buChar char="§"/>
             </a:pPr>
             <a:r>
-              <a:rPr lang="en-US" sz="1725" dirty="0" smtClean="0">
-                <a:solidFill>
-                  <a:schemeClr val="tx1"/>
-                </a:solidFill>
-              </a:rPr>
-              <a:t> </a:t>
-            </a:r>
-            <a:r>
               <a:rPr lang="en-GB" sz="1800" b="1" dirty="0" smtClean="0"/>
-              <a:t>Rhone Service-Based Query Rewriting Algorithm</a:t>
+              <a:t>Rhone </a:t>
+            </a:r>
+            <a:r>
+              <a:rPr lang="en-GB" sz="1800" b="1" dirty="0" smtClean="0"/>
+              <a:t>Service-Based Query Rewriting Algorithm</a:t>
             </a:r>
           </a:p>
           <a:p>
@@ -29317,22 +30431,16 @@
                   <a:schemeClr val="tx1"/>
                 </a:solidFill>
               </a:rPr>
-              <a:t>Lessons learned and future work</a:t>
-            </a:r>
-            <a:endParaRPr lang="en-US" sz="1725" dirty="0" smtClean="0">
-              <a:solidFill>
-                <a:schemeClr val="tx1"/>
-              </a:solidFill>
-            </a:endParaRPr>
-          </a:p>
-          <a:p>
-            <a:pPr algn="r">
-              <a:lnSpc>
-                <a:spcPct val="200000"/>
-              </a:lnSpc>
-              <a:buFont typeface="Wingdings" charset="2"/>
-              <a:buChar char="§"/>
-            </a:pPr>
+              <a:t>Lessons </a:t>
+            </a:r>
+            <a:r>
+              <a:rPr lang="en-GB" sz="1725" b="1" dirty="0" smtClean="0">
+                <a:solidFill>
+                  <a:schemeClr val="tx1"/>
+                </a:solidFill>
+              </a:rPr>
+              <a:t>learned</a:t>
+            </a:r>
             <a:endParaRPr lang="en-US" sz="1725" dirty="0" smtClean="0">
               <a:solidFill>
                 <a:schemeClr val="tx1"/>
@@ -35004,7 +36112,7 @@
           <a:p>
             <a:r>
               <a:rPr lang="en-GB" dirty="0" smtClean="0"/>
-              <a:t>Rhone’s profile</a:t>
+              <a:t>Lessons learned</a:t>
             </a:r>
             <a:endParaRPr lang="en-GB" dirty="0"/>
           </a:p>
@@ -37461,8 +38569,8 @@
         </p:nvSpPr>
         <p:spPr>
           <a:xfrm>
-            <a:off x="2928364" y="4294951"/>
-            <a:ext cx="3158237" cy="461665"/>
+            <a:off x="2588528" y="4294951"/>
+            <a:ext cx="3837910" cy="276999"/>
           </a:xfrm>
           <a:prstGeom prst="rect">
             <a:avLst/>
@@ -37516,11 +38624,8 @@
                 <a:ea typeface="Consolas" charset="0"/>
                 <a:cs typeface="Consolas" charset="0"/>
               </a:rPr>
-              <a:t>modelled</a:t>
-            </a:r>
-          </a:p>
-          <a:p>
-            <a:pPr algn="ctr"/>
+              <a:t>known </a:t>
+            </a:r>
             <a:r>
               <a:rPr lang="en-GB" sz="1200" dirty="0" smtClean="0">
                 <a:solidFill>
@@ -37533,7 +38638,7 @@
                 <a:ea typeface="Consolas" charset="0"/>
                 <a:cs typeface="Consolas" charset="0"/>
               </a:rPr>
-              <a:t>&amp; known in advance</a:t>
+              <a:t>in advance</a:t>
             </a:r>
             <a:endParaRPr lang="fr-FR" sz="1200" dirty="0" smtClean="0">
               <a:solidFill>
@@ -38925,14 +40030,14 @@
               </a:ln>
               <a:extLst>
                 <a:ext uri="{909E8E84-426E-40dd-AFC4-6F175D3DCCD1}">
-                  <a14:hiddenFill xmlns:a14="http://schemas.microsoft.com/office/drawing/2010/main" xmlns="">
+                  <a14:hiddenFill xmlns="" xmlns:a14="http://schemas.microsoft.com/office/drawing/2010/main">
                     <a:solidFill>
                       <a:srgbClr val="FFFFFF"/>
                     </a:solidFill>
                   </a14:hiddenFill>
                 </a:ext>
                 <a:ext uri="{91240B29-F687-4f45-9708-019B960494DF}">
-                  <a14:hiddenLine xmlns:a14="http://schemas.microsoft.com/office/drawing/2010/main" xmlns="" w="9525">
+                  <a14:hiddenLine xmlns="" xmlns:a14="http://schemas.microsoft.com/office/drawing/2010/main" w="9525">
                     <a:solidFill>
                       <a:srgbClr val="000000"/>
                     </a:solidFill>
@@ -38986,14 +40091,14 @@
               </a:ln>
               <a:extLst>
                 <a:ext uri="{909E8E84-426E-40dd-AFC4-6F175D3DCCD1}">
-                  <a14:hiddenFill xmlns:a14="http://schemas.microsoft.com/office/drawing/2010/main" xmlns="">
+                  <a14:hiddenFill xmlns="" xmlns:a14="http://schemas.microsoft.com/office/drawing/2010/main">
                     <a:solidFill>
                       <a:srgbClr val="FFFFFF"/>
                     </a:solidFill>
                   </a14:hiddenFill>
                 </a:ext>
                 <a:ext uri="{91240B29-F687-4f45-9708-019B960494DF}">
-                  <a14:hiddenLine xmlns:a14="http://schemas.microsoft.com/office/drawing/2010/main" xmlns="" w="9525">
+                  <a14:hiddenLine xmlns="" xmlns:a14="http://schemas.microsoft.com/office/drawing/2010/main" w="9525">
                     <a:solidFill>
                       <a:srgbClr val="000000"/>
                     </a:solidFill>
@@ -39047,14 +40152,14 @@
               </a:ln>
               <a:extLst>
                 <a:ext uri="{909E8E84-426E-40dd-AFC4-6F175D3DCCD1}">
-                  <a14:hiddenFill xmlns:a14="http://schemas.microsoft.com/office/drawing/2010/main" xmlns="">
+                  <a14:hiddenFill xmlns="" xmlns:a14="http://schemas.microsoft.com/office/drawing/2010/main">
                     <a:solidFill>
                       <a:srgbClr val="FFFFFF"/>
                     </a:solidFill>
                   </a14:hiddenFill>
                 </a:ext>
                 <a:ext uri="{91240B29-F687-4f45-9708-019B960494DF}">
-                  <a14:hiddenLine xmlns:a14="http://schemas.microsoft.com/office/drawing/2010/main" xmlns="" w="9525">
+                  <a14:hiddenLine xmlns="" xmlns:a14="http://schemas.microsoft.com/office/drawing/2010/main" w="9525">
                     <a:solidFill>
                       <a:srgbClr val="000000"/>
                     </a:solidFill>
@@ -39088,14 +40193,14 @@
               </a:ln>
               <a:extLst>
                 <a:ext uri="{909E8E84-426E-40dd-AFC4-6F175D3DCCD1}">
-                  <a14:hiddenFill xmlns:a14="http://schemas.microsoft.com/office/drawing/2010/main" xmlns="">
+                  <a14:hiddenFill xmlns="" xmlns:a14="http://schemas.microsoft.com/office/drawing/2010/main">
                     <a:solidFill>
                       <a:srgbClr val="FFFFFF"/>
                     </a:solidFill>
                   </a14:hiddenFill>
                 </a:ext>
                 <a:ext uri="{91240B29-F687-4f45-9708-019B960494DF}">
-                  <a14:hiddenLine xmlns:a14="http://schemas.microsoft.com/office/drawing/2010/main" xmlns="" w="9525">
+                  <a14:hiddenLine xmlns="" xmlns:a14="http://schemas.microsoft.com/office/drawing/2010/main" w="9525">
                     <a:solidFill>
                       <a:srgbClr val="000000"/>
                     </a:solidFill>
@@ -39712,14 +40817,14 @@
             </a:ln>
             <a:extLst>
               <a:ext uri="{909E8E84-426E-40dd-AFC4-6F175D3DCCD1}">
-                <a14:hiddenFill xmlns:a14="http://schemas.microsoft.com/office/drawing/2010/main" xmlns="">
+                <a14:hiddenFill xmlns="" xmlns:a14="http://schemas.microsoft.com/office/drawing/2010/main">
                   <a:solidFill>
                     <a:srgbClr val="FFFFFF"/>
                   </a:solidFill>
                 </a14:hiddenFill>
               </a:ext>
               <a:ext uri="{91240B29-F687-4f45-9708-019B960494DF}">
-                <a14:hiddenLine xmlns:a14="http://schemas.microsoft.com/office/drawing/2010/main" xmlns="" w="9525">
+                <a14:hiddenLine xmlns="" xmlns:a14="http://schemas.microsoft.com/office/drawing/2010/main" w="9525">
                   <a:solidFill>
                     <a:srgbClr val="000000"/>
                   </a:solidFill>
@@ -39766,14 +40871,14 @@
             </a:ln>
             <a:extLst>
               <a:ext uri="{909E8E84-426E-40dd-AFC4-6F175D3DCCD1}">
-                <a14:hiddenFill xmlns:a14="http://schemas.microsoft.com/office/drawing/2010/main" xmlns="">
+                <a14:hiddenFill xmlns="" xmlns:a14="http://schemas.microsoft.com/office/drawing/2010/main">
                   <a:solidFill>
                     <a:srgbClr val="FFFFFF"/>
                   </a:solidFill>
                 </a14:hiddenFill>
               </a:ext>
               <a:ext uri="{91240B29-F687-4f45-9708-019B960494DF}">
-                <a14:hiddenLine xmlns:a14="http://schemas.microsoft.com/office/drawing/2010/main" xmlns="" w="9525">
+                <a14:hiddenLine xmlns="" xmlns:a14="http://schemas.microsoft.com/office/drawing/2010/main" w="9525">
                   <a:solidFill>
                     <a:srgbClr val="000000"/>
                   </a:solidFill>
@@ -39820,14 +40925,14 @@
             </a:ln>
             <a:extLst>
               <a:ext uri="{909E8E84-426E-40dd-AFC4-6F175D3DCCD1}">
-                <a14:hiddenFill xmlns:a14="http://schemas.microsoft.com/office/drawing/2010/main" xmlns="">
+                <a14:hiddenFill xmlns="" xmlns:a14="http://schemas.microsoft.com/office/drawing/2010/main">
                   <a:solidFill>
                     <a:srgbClr val="FFFFFF"/>
                   </a:solidFill>
                 </a14:hiddenFill>
               </a:ext>
               <a:ext uri="{91240B29-F687-4f45-9708-019B960494DF}">
-                <a14:hiddenLine xmlns:a14="http://schemas.microsoft.com/office/drawing/2010/main" xmlns="" w="9525">
+                <a14:hiddenLine xmlns="" xmlns:a14="http://schemas.microsoft.com/office/drawing/2010/main" w="9525">
                   <a:solidFill>
                     <a:srgbClr val="000000"/>
                   </a:solidFill>
@@ -39874,14 +40979,14 @@
             </a:ln>
             <a:extLst>
               <a:ext uri="{909E8E84-426E-40dd-AFC4-6F175D3DCCD1}">
-                <a14:hiddenFill xmlns:a14="http://schemas.microsoft.com/office/drawing/2010/main" xmlns="">
+                <a14:hiddenFill xmlns="" xmlns:a14="http://schemas.microsoft.com/office/drawing/2010/main">
                   <a:solidFill>
                     <a:srgbClr val="FFFFFF"/>
                   </a:solidFill>
                 </a14:hiddenFill>
               </a:ext>
               <a:ext uri="{91240B29-F687-4f45-9708-019B960494DF}">
-                <a14:hiddenLine xmlns:a14="http://schemas.microsoft.com/office/drawing/2010/main" xmlns="" w="9525">
+                <a14:hiddenLine xmlns="" xmlns:a14="http://schemas.microsoft.com/office/drawing/2010/main" w="9525">
                   <a:solidFill>
                     <a:srgbClr val="000000"/>
                   </a:solidFill>
@@ -39950,14 +41055,14 @@
             </a:ln>
             <a:extLst>
               <a:ext uri="{909E8E84-426E-40dd-AFC4-6F175D3DCCD1}">
-                <a14:hiddenFill xmlns:a14="http://schemas.microsoft.com/office/drawing/2010/main" xmlns="">
+                <a14:hiddenFill xmlns="" xmlns:a14="http://schemas.microsoft.com/office/drawing/2010/main">
                   <a:solidFill>
                     <a:srgbClr val="FFFFFF"/>
                   </a:solidFill>
                 </a14:hiddenFill>
               </a:ext>
               <a:ext uri="{91240B29-F687-4f45-9708-019B960494DF}">
-                <a14:hiddenLine xmlns:a14="http://schemas.microsoft.com/office/drawing/2010/main" xmlns="" w="9525">
+                <a14:hiddenLine xmlns="" xmlns:a14="http://schemas.microsoft.com/office/drawing/2010/main" w="9525">
                   <a:solidFill>
                     <a:srgbClr val="000000"/>
                   </a:solidFill>
@@ -40011,14 +41116,14 @@
             </a:ln>
             <a:extLst>
               <a:ext uri="{909E8E84-426E-40dd-AFC4-6F175D3DCCD1}">
-                <a14:hiddenFill xmlns:a14="http://schemas.microsoft.com/office/drawing/2010/main" xmlns="">
+                <a14:hiddenFill xmlns="" xmlns:a14="http://schemas.microsoft.com/office/drawing/2010/main">
                   <a:solidFill>
                     <a:srgbClr val="FFFFFF"/>
                   </a:solidFill>
                 </a14:hiddenFill>
               </a:ext>
               <a:ext uri="{91240B29-F687-4f45-9708-019B960494DF}">
-                <a14:hiddenLine xmlns:a14="http://schemas.microsoft.com/office/drawing/2010/main" xmlns="" w="9525">
+                <a14:hiddenLine xmlns="" xmlns:a14="http://schemas.microsoft.com/office/drawing/2010/main" w="9525">
                   <a:solidFill>
                     <a:srgbClr val="000000"/>
                   </a:solidFill>
@@ -40080,14 +41185,14 @@
               </a:ln>
               <a:extLst>
                 <a:ext uri="{909E8E84-426E-40dd-AFC4-6F175D3DCCD1}">
-                  <a14:hiddenFill xmlns:a14="http://schemas.microsoft.com/office/drawing/2010/main" xmlns="">
+                  <a14:hiddenFill xmlns="" xmlns:a14="http://schemas.microsoft.com/office/drawing/2010/main">
                     <a:solidFill>
                       <a:srgbClr val="FFFFFF"/>
                     </a:solidFill>
                   </a14:hiddenFill>
                 </a:ext>
                 <a:ext uri="{91240B29-F687-4f45-9708-019B960494DF}">
-                  <a14:hiddenLine xmlns:a14="http://schemas.microsoft.com/office/drawing/2010/main" xmlns="" w="9525">
+                  <a14:hiddenLine xmlns="" xmlns:a14="http://schemas.microsoft.com/office/drawing/2010/main" w="9525">
                     <a:solidFill>
                       <a:srgbClr val="000000"/>
                     </a:solidFill>
@@ -40141,14 +41246,14 @@
               </a:ln>
               <a:extLst>
                 <a:ext uri="{909E8E84-426E-40dd-AFC4-6F175D3DCCD1}">
-                  <a14:hiddenFill xmlns:a14="http://schemas.microsoft.com/office/drawing/2010/main" xmlns="">
+                  <a14:hiddenFill xmlns="" xmlns:a14="http://schemas.microsoft.com/office/drawing/2010/main">
                     <a:solidFill>
                       <a:srgbClr val="FFFFFF"/>
                     </a:solidFill>
                   </a14:hiddenFill>
                 </a:ext>
                 <a:ext uri="{91240B29-F687-4f45-9708-019B960494DF}">
-                  <a14:hiddenLine xmlns:a14="http://schemas.microsoft.com/office/drawing/2010/main" xmlns="" w="9525">
+                  <a14:hiddenLine xmlns="" xmlns:a14="http://schemas.microsoft.com/office/drawing/2010/main" w="9525">
                     <a:solidFill>
                       <a:srgbClr val="000000"/>
                     </a:solidFill>
@@ -40202,14 +41307,14 @@
               </a:ln>
               <a:extLst>
                 <a:ext uri="{909E8E84-426E-40dd-AFC4-6F175D3DCCD1}">
-                  <a14:hiddenFill xmlns:a14="http://schemas.microsoft.com/office/drawing/2010/main" xmlns="">
+                  <a14:hiddenFill xmlns="" xmlns:a14="http://schemas.microsoft.com/office/drawing/2010/main">
                     <a:solidFill>
                       <a:srgbClr val="FFFFFF"/>
                     </a:solidFill>
                   </a14:hiddenFill>
                 </a:ext>
                 <a:ext uri="{91240B29-F687-4f45-9708-019B960494DF}">
-                  <a14:hiddenLine xmlns:a14="http://schemas.microsoft.com/office/drawing/2010/main" xmlns="" w="9525">
+                  <a14:hiddenLine xmlns="" xmlns:a14="http://schemas.microsoft.com/office/drawing/2010/main" w="9525">
                     <a:solidFill>
                       <a:srgbClr val="000000"/>
                     </a:solidFill>
@@ -40259,14 +41364,14 @@
             </a:ln>
             <a:extLst>
               <a:ext uri="{909E8E84-426E-40dd-AFC4-6F175D3DCCD1}">
-                <a14:hiddenFill xmlns:a14="http://schemas.microsoft.com/office/drawing/2010/main" xmlns="">
+                <a14:hiddenFill xmlns="" xmlns:a14="http://schemas.microsoft.com/office/drawing/2010/main">
                   <a:solidFill>
                     <a:srgbClr val="FFFFFF"/>
                   </a:solidFill>
                 </a14:hiddenFill>
               </a:ext>
               <a:ext uri="{91240B29-F687-4f45-9708-019B960494DF}">
-                <a14:hiddenLine xmlns:a14="http://schemas.microsoft.com/office/drawing/2010/main" xmlns="" w="9525">
+                <a14:hiddenLine xmlns="" xmlns:a14="http://schemas.microsoft.com/office/drawing/2010/main" w="9525">
                   <a:solidFill>
                     <a:srgbClr val="000000"/>
                   </a:solidFill>
@@ -40683,14 +41788,14 @@
             </a:ln>
             <a:extLst>
               <a:ext uri="{909E8E84-426E-40dd-AFC4-6F175D3DCCD1}">
-                <a14:hiddenFill xmlns:a14="http://schemas.microsoft.com/office/drawing/2010/main" xmlns="">
+                <a14:hiddenFill xmlns="" xmlns:a14="http://schemas.microsoft.com/office/drawing/2010/main">
                   <a:solidFill>
                     <a:srgbClr val="FFFFFF"/>
                   </a:solidFill>
                 </a14:hiddenFill>
               </a:ext>
               <a:ext uri="{91240B29-F687-4f45-9708-019B960494DF}">
-                <a14:hiddenLine xmlns:a14="http://schemas.microsoft.com/office/drawing/2010/main" xmlns="" w="9525">
+                <a14:hiddenLine xmlns="" xmlns:a14="http://schemas.microsoft.com/office/drawing/2010/main" w="9525">
                   <a:solidFill>
                     <a:srgbClr val="000000"/>
                   </a:solidFill>
@@ -40744,14 +41849,14 @@
             </a:ln>
             <a:extLst>
               <a:ext uri="{909E8E84-426E-40dd-AFC4-6F175D3DCCD1}">
-                <a14:hiddenFill xmlns:a14="http://schemas.microsoft.com/office/drawing/2010/main" xmlns="">
+                <a14:hiddenFill xmlns="" xmlns:a14="http://schemas.microsoft.com/office/drawing/2010/main">
                   <a:solidFill>
                     <a:srgbClr val="FFFFFF"/>
                   </a:solidFill>
                 </a14:hiddenFill>
               </a:ext>
               <a:ext uri="{91240B29-F687-4f45-9708-019B960494DF}">
-                <a14:hiddenLine xmlns:a14="http://schemas.microsoft.com/office/drawing/2010/main" xmlns="" w="9525">
+                <a14:hiddenLine xmlns="" xmlns:a14="http://schemas.microsoft.com/office/drawing/2010/main" w="9525">
                   <a:solidFill>
                     <a:srgbClr val="000000"/>
                   </a:solidFill>
@@ -40805,14 +41910,14 @@
             </a:ln>
             <a:extLst>
               <a:ext uri="{909E8E84-426E-40dd-AFC4-6F175D3DCCD1}">
-                <a14:hiddenFill xmlns:a14="http://schemas.microsoft.com/office/drawing/2010/main" xmlns="">
+                <a14:hiddenFill xmlns="" xmlns:a14="http://schemas.microsoft.com/office/drawing/2010/main">
                   <a:solidFill>
                     <a:srgbClr val="FFFFFF"/>
                   </a:solidFill>
                 </a14:hiddenFill>
               </a:ext>
               <a:ext uri="{91240B29-F687-4f45-9708-019B960494DF}">
-                <a14:hiddenLine xmlns:a14="http://schemas.microsoft.com/office/drawing/2010/main" xmlns="" w="9525">
+                <a14:hiddenLine xmlns="" xmlns:a14="http://schemas.microsoft.com/office/drawing/2010/main" w="9525">
                   <a:solidFill>
                     <a:srgbClr val="000000"/>
                   </a:solidFill>
@@ -40846,14 +41951,14 @@
             </a:ln>
             <a:extLst>
               <a:ext uri="{909E8E84-426E-40dd-AFC4-6F175D3DCCD1}">
-                <a14:hiddenFill xmlns:a14="http://schemas.microsoft.com/office/drawing/2010/main" xmlns="">
+                <a14:hiddenFill xmlns="" xmlns:a14="http://schemas.microsoft.com/office/drawing/2010/main">
                   <a:solidFill>
                     <a:srgbClr val="FFFFFF"/>
                   </a:solidFill>
                 </a14:hiddenFill>
               </a:ext>
               <a:ext uri="{91240B29-F687-4f45-9708-019B960494DF}">
-                <a14:hiddenLine xmlns:a14="http://schemas.microsoft.com/office/drawing/2010/main" xmlns="" w="9525">
+                <a14:hiddenLine xmlns="" xmlns:a14="http://schemas.microsoft.com/office/drawing/2010/main" w="9525">
                   <a:solidFill>
                     <a:srgbClr val="000000"/>
                   </a:solidFill>

</xml_diff>

<commit_message>
ICSOC: Adding new references to related works
</commit_message>
<xml_diff>
--- a/Presentations/ADBIS 2016/Presentation_ADBIS 2016.pptx
+++ b/Presentations/ADBIS 2016/Presentation_ADBIS 2016.pptx
@@ -235,7 +235,7 @@
           <a:p>
             <a:fld id="{652FA383-9D4B-AD42-9BF3-88FCA749BE0E}" type="datetimeFigureOut">
               <a:rPr lang="en-US" smtClean="0"/>
-              <a:t>8/24/2016</a:t>
+              <a:t>8/30/2016</a:t>
             </a:fld>
             <a:endParaRPr lang="pt-BR"/>
           </a:p>
@@ -400,7 +400,7 @@
           <a:p>
             <a:fld id="{C888862E-4053-6841-80C1-EE02861216A5}" type="datetimeFigureOut">
               <a:rPr lang="en-US" smtClean="0"/>
-              <a:t>8/24/2016</a:t>
+              <a:t>8/30/2016</a:t>
             </a:fld>
             <a:endParaRPr lang="pt-BR"/>
           </a:p>
@@ -1756,39 +1756,15 @@
               <a:rPr lang="fr-FR" baseline="0" dirty="0" smtClean="0">
                 <a:latin typeface="Calibri"/>
               </a:rPr>
-              <a:t>Our algorithm </a:t>
-            </a:r>
+              <a:t>Our algorithm customizes:</a:t>
+            </a:r>
+          </a:p>
+          <a:p>
             <a:r>
               <a:rPr lang="fr-FR" baseline="0" dirty="0" smtClean="0">
                 <a:latin typeface="Calibri"/>
               </a:rPr>
-              <a:t>customizes:</a:t>
-            </a:r>
-          </a:p>
-          <a:p>
-            <a:r>
-              <a:rPr lang="fr-FR" baseline="0" dirty="0" smtClean="0">
-                <a:latin typeface="Calibri"/>
-              </a:rPr>
-              <a:t>The </a:t>
-            </a:r>
-            <a:r>
-              <a:rPr lang="fr-FR" baseline="0" dirty="0" smtClean="0">
-                <a:latin typeface="Calibri"/>
-              </a:rPr>
-              <a:t>data providers services look up</a:t>
-            </a:r>
-            <a:r>
-              <a:rPr lang="fr-FR" baseline="0" dirty="0" smtClean="0">
-                <a:latin typeface="Calibri"/>
-              </a:rPr>
-              <a:t>. The data </a:t>
-            </a:r>
-            <a:r>
-              <a:rPr lang="fr-FR" baseline="0" dirty="0" smtClean="0">
-                <a:latin typeface="Calibri"/>
-              </a:rPr>
-              <a:t>integration </a:t>
+              <a:t>The data providers services look up. The data integration </a:t>
             </a:r>
             <a:r>
               <a:rPr lang="en-US" sz="1200" dirty="0" smtClean="0">
@@ -2019,25 +1995,7 @@
               <a:rPr lang="fr-FR" baseline="0" dirty="0" smtClean="0">
                 <a:latin typeface="Calibri"/>
               </a:rPr>
-              <a:t> the first step </a:t>
-            </a:r>
-            <a:r>
-              <a:rPr lang="fr-FR" baseline="0" dirty="0" smtClean="0">
-                <a:latin typeface="Calibri"/>
-              </a:rPr>
-              <a:t>candidate concrete services </a:t>
-            </a:r>
-            <a:r>
-              <a:rPr lang="fr-FR" baseline="0" dirty="0" smtClean="0">
-                <a:latin typeface="Calibri"/>
-              </a:rPr>
-              <a:t>are </a:t>
-            </a:r>
-            <a:r>
-              <a:rPr lang="fr-FR" baseline="0" dirty="0" smtClean="0">
-                <a:latin typeface="Calibri"/>
-              </a:rPr>
-              <a:t>selected.</a:t>
+              <a:t> the first step candidate concrete services are selected.</a:t>
             </a:r>
           </a:p>
           <a:p>
@@ -2171,31 +2129,23 @@
               <a:rPr lang="fr-FR" baseline="0" dirty="0" smtClean="0">
                 <a:latin typeface="Calibri"/>
               </a:rPr>
-              <a:t> instance, in this step considering a </a:t>
-            </a:r>
-            <a:r>
-              <a:rPr lang="fr-FR" baseline="0" dirty="0" smtClean="0">
-                <a:latin typeface="Calibri"/>
-              </a:rPr>
-              <a:t>query with preferences and a </a:t>
-            </a:r>
-            <a:r>
-              <a:rPr lang="fr-FR" baseline="0" dirty="0" smtClean="0">
-                <a:latin typeface="Calibri"/>
-              </a:rPr>
-              <a:t>set of concrete services</a:t>
-            </a:r>
-            <a:r>
-              <a:rPr lang="fr-FR" baseline="0" dirty="0" smtClean="0">
-                <a:latin typeface="Calibri"/>
-              </a:rPr>
-              <a:t>.</a:t>
-            </a:r>
+              <a:t> instance, in this step considering a query with preferences and a set of concrete services.</a:t>
+            </a:r>
+          </a:p>
+          <a:p>
             <a:endParaRPr lang="fr-FR" baseline="0" dirty="0" smtClean="0">
               <a:latin typeface="Calibri"/>
             </a:endParaRPr>
           </a:p>
           <a:p>
+            <a:r>
+              <a:rPr lang="fr-FR" baseline="0" dirty="0" smtClean="0">
+                <a:latin typeface="Calibri"/>
+              </a:rPr>
+              <a:t>We have to choose those services that match data required with data produced.</a:t>
+            </a:r>
+          </a:p>
+          <a:p>
             <a:endParaRPr lang="fr-FR" baseline="0" dirty="0" smtClean="0">
               <a:latin typeface="Calibri"/>
             </a:endParaRPr>
@@ -2205,19 +2155,23 @@
               <a:rPr lang="fr-FR" baseline="0" dirty="0" smtClean="0">
                 <a:latin typeface="Calibri"/>
               </a:rPr>
-              <a:t>We have to choose those </a:t>
-            </a:r>
-            <a:r>
-              <a:rPr lang="fr-FR" baseline="0" dirty="0" smtClean="0">
-                <a:latin typeface="Calibri"/>
-              </a:rPr>
-              <a:t>services that match data required with data produced.</a:t>
-            </a:r>
+              <a:t>Click</a:t>
+            </a:r>
+          </a:p>
+          <a:p>
             <a:endParaRPr lang="fr-FR" baseline="0" dirty="0" smtClean="0">
               <a:latin typeface="Calibri"/>
             </a:endParaRPr>
           </a:p>
           <a:p>
+            <a:r>
+              <a:rPr lang="fr-FR" baseline="0" dirty="0" smtClean="0">
+                <a:latin typeface="Calibri"/>
+              </a:rPr>
+              <a:t>As you can see we select services that can produce a result for the user query.</a:t>
+            </a:r>
+          </a:p>
+          <a:p>
             <a:endParaRPr lang="fr-FR" baseline="0" dirty="0" smtClean="0">
               <a:latin typeface="Calibri"/>
             </a:endParaRPr>
@@ -2227,54 +2181,7 @@
               <a:rPr lang="fr-FR" baseline="0" dirty="0" smtClean="0">
                 <a:latin typeface="Calibri"/>
               </a:rPr>
-              <a:t>Click</a:t>
-            </a:r>
-          </a:p>
-          <a:p>
-            <a:endParaRPr lang="fr-FR" baseline="0" dirty="0" smtClean="0">
-              <a:latin typeface="Calibri"/>
-            </a:endParaRPr>
-          </a:p>
-          <a:p>
-            <a:r>
-              <a:rPr lang="fr-FR" baseline="0" dirty="0" smtClean="0">
-                <a:latin typeface="Calibri"/>
-              </a:rPr>
-              <a:t>As you can see we select services that can produce a result for the user query</a:t>
-            </a:r>
-            <a:r>
-              <a:rPr lang="fr-FR" baseline="0" dirty="0" smtClean="0">
-                <a:latin typeface="Calibri"/>
-              </a:rPr>
-              <a:t>.</a:t>
-            </a:r>
-            <a:endParaRPr lang="fr-FR" baseline="0" dirty="0" smtClean="0">
-              <a:latin typeface="Calibri"/>
-            </a:endParaRPr>
-          </a:p>
-          <a:p>
-            <a:endParaRPr lang="fr-FR" baseline="0" dirty="0" smtClean="0">
-              <a:latin typeface="Calibri"/>
-            </a:endParaRPr>
-          </a:p>
-          <a:p>
-            <a:r>
-              <a:rPr lang="fr-FR" baseline="0" dirty="0" smtClean="0">
-                <a:latin typeface="Calibri"/>
-              </a:rPr>
-              <a:t>And, consequently</a:t>
-            </a:r>
-            <a:r>
-              <a:rPr lang="fr-FR" baseline="0" dirty="0" smtClean="0">
-                <a:latin typeface="Calibri"/>
-              </a:rPr>
-              <a:t>, the service S7 is discarded once it can not produce a result to the </a:t>
-            </a:r>
-            <a:r>
-              <a:rPr lang="fr-FR" baseline="0" dirty="0" smtClean="0">
-                <a:latin typeface="Calibri"/>
-              </a:rPr>
-              <a:t>query.</a:t>
+              <a:t>And, consequently, the service S7 is discarded once it can not produce a result to the query.</a:t>
             </a:r>
           </a:p>
           <a:p>
@@ -2572,11 +2479,7 @@
             </a:r>
             <a:r>
               <a:rPr lang="es-ES_tradnl" baseline="0" dirty="0" smtClean="0"/>
-              <a:t> S1 and </a:t>
-            </a:r>
-            <a:r>
-              <a:rPr lang="es-ES_tradnl" baseline="0" dirty="0" smtClean="0"/>
-              <a:t>S6 do </a:t>
+              <a:t> S1 and S6 do </a:t>
             </a:r>
             <a:r>
               <a:rPr lang="es-ES_tradnl" baseline="0" dirty="0" err="1" smtClean="0"/>
@@ -2632,11 +2535,7 @@
             </a:r>
             <a:r>
               <a:rPr lang="es-ES_tradnl" baseline="0" dirty="0" smtClean="0"/>
-              <a:t> </a:t>
-            </a:r>
-            <a:r>
-              <a:rPr lang="es-ES_tradnl" baseline="0" dirty="0" smtClean="0"/>
-              <a:t>are </a:t>
+              <a:t> are </a:t>
             </a:r>
             <a:r>
               <a:rPr lang="es-ES_tradnl" baseline="0" dirty="0" err="1" smtClean="0"/>
@@ -2646,7 +2545,6 @@
               <a:rPr lang="es-ES_tradnl" baseline="0" dirty="0" smtClean="0"/>
               <a:t>.</a:t>
             </a:r>
-            <a:endParaRPr lang="es-ES_tradnl" baseline="0" dirty="0" smtClean="0"/>
           </a:p>
           <a:p>
             <a:endParaRPr lang="es-ES_tradnl" baseline="0" dirty="0" smtClean="0"/>
@@ -2982,7 +2880,6 @@
               <a:rPr lang="es-ES_tradnl" baseline="0" dirty="0" smtClean="0"/>
               <a:t> CSD).</a:t>
             </a:r>
-            <a:endParaRPr lang="es-ES_tradnl" baseline="0" dirty="0" smtClean="0"/>
           </a:p>
           <a:p>
             <a:endParaRPr lang="es-ES_tradnl" baseline="0" dirty="0" smtClean="0"/>
@@ -3555,13 +3452,7 @@
               <a:rPr lang="fr-FR" baseline="0" dirty="0" smtClean="0">
                 <a:latin typeface="Calibri"/>
               </a:rPr>
-              <a:t>A CSD for S4 cannot be created once </a:t>
-            </a:r>
-            <a:r>
-              <a:rPr lang="fr-FR" baseline="0" dirty="0" smtClean="0">
-                <a:latin typeface="Calibri"/>
-              </a:rPr>
-              <a:t>the variables mapping is not possible. </a:t>
+              <a:t>A CSD for S4 cannot be created once the variables mapping is not possible. </a:t>
             </a:r>
           </a:p>
           <a:p>
@@ -3587,17 +3478,8 @@
               <a:rPr lang="fr-FR" baseline="0" dirty="0" smtClean="0">
                 <a:latin typeface="Calibri"/>
               </a:rPr>
-              <a:t>Given these 3 CSDs the combinations are produced taking into account the part of the query that it covers. In this case, 3 combiantions are </a:t>
-            </a:r>
-            <a:r>
-              <a:rPr lang="fr-FR" baseline="0" dirty="0" smtClean="0">
-                <a:latin typeface="Calibri"/>
-              </a:rPr>
-              <a:t>generated.</a:t>
-            </a:r>
-            <a:endParaRPr lang="fr-FR" baseline="0" dirty="0" smtClean="0">
-              <a:latin typeface="Calibri"/>
-            </a:endParaRPr>
+              <a:t>Given these 3 CSDs the combinations are produced taking into account the part of the query that it covers. In this case, 3 combiantions are generated.</a:t>
+            </a:r>
           </a:p>
         </p:txBody>
       </p:sp>
@@ -3738,11 +3620,11 @@
             </a:r>
             <a:r>
               <a:rPr lang="en-US" baseline="0" dirty="0" smtClean="0"/>
-              <a:t> our algorithm</a:t>
+              <a:t> our </a:t>
             </a:r>
             <a:r>
               <a:rPr lang="en-US" dirty="0" smtClean="0"/>
-              <a:t>  query</a:t>
+              <a:t>query</a:t>
             </a:r>
             <a:r>
               <a:rPr lang="en-US" baseline="0" dirty="0" smtClean="0"/>
@@ -3878,13 +3760,7 @@
               <a:rPr lang="fr-FR" dirty="0" smtClean="0">
                 <a:latin typeface="Calibri"/>
               </a:rPr>
-              <a:t>The last step ‘producing rewriting’ </a:t>
-            </a:r>
-            <a:r>
-              <a:rPr lang="fr-FR" dirty="0" smtClean="0">
-                <a:latin typeface="Calibri"/>
-              </a:rPr>
-              <a:t>in which we</a:t>
+              <a:t>The last step ‘producing rewriting’ in which we</a:t>
             </a:r>
             <a:r>
               <a:rPr lang="fr-FR" baseline="0" dirty="0" smtClean="0">
@@ -4009,32 +3885,26 @@
               </a:rPr>
               <a:t> to the combination produced. We have to verify if they cover the entire query and exactly what the user expects.  </a:t>
             </a:r>
+          </a:p>
+          <a:p>
             <a:endParaRPr lang="fr-FR" baseline="0" dirty="0" smtClean="0">
               <a:latin typeface="Calibri"/>
             </a:endParaRPr>
           </a:p>
           <a:p>
-            <a:endParaRPr lang="fr-FR" baseline="0" dirty="0" smtClean="0">
-              <a:latin typeface="Calibri"/>
-            </a:endParaRPr>
-          </a:p>
-          <a:p>
             <a:r>
               <a:rPr lang="fr-FR" baseline="0" dirty="0" smtClean="0">
                 <a:latin typeface="Calibri"/>
               </a:rPr>
               <a:t>Click</a:t>
             </a:r>
-            <a:endParaRPr lang="fr-FR" baseline="0" dirty="0" smtClean="0">
-              <a:latin typeface="Calibri"/>
-            </a:endParaRPr>
           </a:p>
           <a:p>
             <a:r>
               <a:rPr lang="fr-FR" baseline="0" dirty="0" smtClean="0">
                 <a:latin typeface="Calibri"/>
               </a:rPr>
-              <a:t>In this sense, only p3 is a valid rewrite of the query. </a:t>
+              <a:t>In this sense, only p3 is a valid rewrite of the query. Why?</a:t>
             </a:r>
             <a:endParaRPr lang="fr-FR" dirty="0">
               <a:latin typeface="Calibri"/>
@@ -4159,39 +4029,22 @@
             </a:pPr>
             <a:r>
               <a:rPr lang="en-US" baseline="0" noProof="0" dirty="0" smtClean="0"/>
-              <a:t>The </a:t>
-            </a:r>
+              <a:t>The idea behind the experiments is to evaluate the </a:t>
+            </a:r>
+            <a:r>
+              <a:rPr lang="en-US" sz="1200" dirty="0" smtClean="0">
+                <a:solidFill>
+                  <a:schemeClr val="tx1"/>
+                </a:solidFill>
+              </a:rPr>
+              <a:t>algorithm’s behavior.</a:t>
+            </a:r>
+          </a:p>
+          <a:p>
             <a:r>
               <a:rPr lang="en-US" baseline="0" noProof="0" dirty="0" smtClean="0"/>
-              <a:t>idea behind the experiments is to </a:t>
-            </a:r>
-            <a:r>
-              <a:rPr lang="en-US" baseline="0" noProof="0" dirty="0" smtClean="0"/>
-              <a:t>evaluate the </a:t>
-            </a:r>
-            <a:r>
-              <a:rPr lang="en-US" sz="1200" dirty="0" smtClean="0">
-                <a:solidFill>
-                  <a:schemeClr val="tx1"/>
-                </a:solidFill>
-              </a:rPr>
-              <a:t>algorithm’s behavior.</a:t>
-            </a:r>
-          </a:p>
-          <a:p>
-            <a:r>
-              <a:rPr lang="en-US" baseline="0" noProof="0" dirty="0" smtClean="0"/>
-              <a:t>To do so, the </a:t>
-            </a:r>
-            <a:r>
-              <a:rPr lang="en-US" baseline="0" noProof="0" dirty="0" smtClean="0"/>
-              <a:t>experiments were executed in a local </a:t>
-            </a:r>
-            <a:r>
-              <a:rPr lang="en-US" baseline="0" noProof="0" dirty="0" smtClean="0"/>
-              <a:t>environment including a service registry of 100 concrete services.</a:t>
-            </a:r>
-            <a:endParaRPr lang="en-US" baseline="0" noProof="0" dirty="0" smtClean="0"/>
+              <a:t>To do so, the experiments were executed in a local environment including a service registry of 100 concrete services.</a:t>
+            </a:r>
           </a:p>
           <a:p>
             <a:r>
@@ -4299,21 +4152,8 @@
           <a:p>
             <a:r>
               <a:rPr lang="fr-FR" baseline="0" dirty="0" smtClean="0"/>
-              <a:t>We can see the complexity of the different  </a:t>
-            </a:r>
-            <a:r>
-              <a:rPr lang="fr-FR" baseline="0" dirty="0" smtClean="0"/>
-              <a:t>phases. As </a:t>
-            </a:r>
-            <a:r>
-              <a:rPr lang="fr-FR" baseline="0" dirty="0" smtClean="0"/>
-              <a:t>in the other algorithms, the most expensive step is the combination. It depends on the size of the query and the number of concrete service that could be mapped to the </a:t>
-            </a:r>
-            <a:r>
-              <a:rPr lang="fr-FR" baseline="0" dirty="0" smtClean="0"/>
-              <a:t>query.</a:t>
-            </a:r>
-            <a:endParaRPr lang="fr-FR" baseline="0" dirty="0" smtClean="0"/>
+              <a:t>We can see the complexity of the different  phases. As in the other algorithms, the most expensive step is the combination. It depends on the size of the query and the number of concrete service that could be mapped to the query.</a:t>
+            </a:r>
           </a:p>
           <a:p>
             <a:endParaRPr lang="fr-FR" baseline="0" dirty="0" smtClean="0"/>
@@ -4331,11 +4171,7 @@
             </a:pPr>
             <a:r>
               <a:rPr lang="fr-FR" baseline="0" dirty="0" smtClean="0"/>
-              <a:t>The performance increased </a:t>
-            </a:r>
-            <a:r>
-              <a:rPr lang="fr-FR" baseline="0" dirty="0" smtClean="0"/>
-              <a:t>by </a:t>
+              <a:t>The performance increased by </a:t>
             </a:r>
             <a:r>
               <a:rPr lang="en-GB" dirty="0" smtClean="0"/>
@@ -4347,42 +4183,13 @@
             </a:r>
             <a:r>
               <a:rPr lang="fr-FR" baseline="0" dirty="0" smtClean="0"/>
-              <a:t>As </a:t>
-            </a:r>
+              <a:t>As we can see in the chart on the left.</a:t>
+            </a:r>
+          </a:p>
+          <a:p>
             <a:r>
               <a:rPr lang="fr-FR" baseline="0" dirty="0" smtClean="0"/>
-              <a:t>we can see in the chart on the </a:t>
-            </a:r>
-            <a:r>
-              <a:rPr lang="fr-FR" baseline="0" dirty="0" smtClean="0"/>
-              <a:t>left.</a:t>
-            </a:r>
-            <a:endParaRPr lang="fr-FR" baseline="0" dirty="0" smtClean="0"/>
-          </a:p>
-          <a:p>
-            <a:r>
-              <a:rPr lang="fr-FR" baseline="0" dirty="0" smtClean="0"/>
-              <a:t>Rewritring solutions </a:t>
-            </a:r>
-            <a:r>
-              <a:rPr lang="fr-FR" baseline="0" dirty="0" smtClean="0"/>
-              <a:t>quality enhanced and the integration </a:t>
-            </a:r>
-            <a:r>
-              <a:rPr lang="fr-FR" baseline="0" dirty="0" smtClean="0"/>
-              <a:t>economic </a:t>
-            </a:r>
-            <a:r>
-              <a:rPr lang="fr-FR" baseline="0" dirty="0" smtClean="0"/>
-              <a:t>cost is reduced once only rewriting that satisfies the user preferences are produced. As </a:t>
-            </a:r>
-            <a:r>
-              <a:rPr lang="fr-FR" baseline="0" dirty="0" smtClean="0"/>
-              <a:t>we can see in the chart on the </a:t>
-            </a:r>
-            <a:r>
-              <a:rPr lang="fr-FR" baseline="0" dirty="0" smtClean="0"/>
-              <a:t>right.</a:t>
+              <a:t>Rewritring solutions quality enhanced and the integration economic cost is reduced once only rewriting that satisfies the user preferences are produced. As we can see in the chart on the right.</a:t>
             </a:r>
           </a:p>
           <a:p>
@@ -4795,23 +4602,6 @@
           <a:p>
             <a:pPr lvl="1" algn="l"/>
             <a:r>
-              <a:rPr lang="en-US" b="1" dirty="0">
-                <a:solidFill>
-                  <a:schemeClr val="tx1"/>
-                </a:solidFill>
-                <a:latin typeface="Calibri"/>
-              </a:rPr>
-              <a:t/>
-            </a:r>
-            <a:br>
-              <a:rPr lang="en-US" b="1" dirty="0">
-                <a:solidFill>
-                  <a:schemeClr val="tx1"/>
-                </a:solidFill>
-                <a:latin typeface="Calibri"/>
-              </a:rPr>
-            </a:br>
-            <a:r>
               <a:rPr lang="en-US" b="1" dirty="0" smtClean="0">
                 <a:solidFill>
                   <a:schemeClr val="tx1"/>
@@ -4881,17 +4671,6 @@
             </a:r>
           </a:p>
           <a:p>
-            <a:pPr marL="685800" lvl="1" indent="-228600" algn="l">
-              <a:buAutoNum type="arabicPeriod"/>
-            </a:pPr>
-            <a:endParaRPr lang="en-US" b="1" baseline="0" dirty="0" smtClean="0">
-              <a:solidFill>
-                <a:schemeClr val="tx1"/>
-              </a:solidFill>
-              <a:latin typeface="Calibri"/>
-            </a:endParaRPr>
-          </a:p>
-          <a:p>
             <a:pPr lvl="1" algn="l"/>
             <a:r>
               <a:rPr lang="en-US" b="1" baseline="0" dirty="0" smtClean="0">
@@ -4905,15 +4684,6 @@
           </a:p>
           <a:p>
             <a:pPr lvl="1" algn="l"/>
-            <a:endParaRPr lang="en-US" b="1" baseline="0" dirty="0" smtClean="0">
-              <a:solidFill>
-                <a:schemeClr val="tx1"/>
-              </a:solidFill>
-              <a:latin typeface="Calibri"/>
-            </a:endParaRPr>
-          </a:p>
-          <a:p>
-            <a:pPr lvl="1" algn="l"/>
             <a:r>
               <a:rPr lang="en-US" b="1" baseline="0" dirty="0" smtClean="0">
                 <a:solidFill>
@@ -4921,7 +4691,7 @@
                 </a:solidFill>
                 <a:latin typeface="Calibri"/>
               </a:rPr>
-              <a:t> 3. The case where only a pivot model and language exist and queries must explicitly express which data from which sources to retrieve.</a:t>
+              <a:t>3. The case where only a pivot model and language exist and queries must explicitly express which data from which sources to retrieve.</a:t>
             </a:r>
           </a:p>
           <a:p>
@@ -5091,11 +4861,47 @@
                 </a:solidFill>
                 <a:latin typeface="Calibri"/>
               </a:rPr>
-              <a:t> emergence of data services changed the data integration problem. Particularly, the hypothesis that assumed that data sources were known in advance.</a:t>
+              <a:t> emergence of data services changed the data integration problem. </a:t>
+            </a:r>
+            <a:r>
+              <a:rPr lang="en-US" b="0" baseline="0" dirty="0" smtClean="0">
+                <a:solidFill>
+                  <a:schemeClr val="tx1"/>
+                </a:solidFill>
+                <a:latin typeface="Calibri"/>
+              </a:rPr>
+              <a:t>Particularly, the hypothesis that assumed that data sources were </a:t>
+            </a:r>
+            <a:r>
+              <a:rPr lang="en-US" b="1" baseline="0" dirty="0" smtClean="0">
+                <a:solidFill>
+                  <a:schemeClr val="tx1"/>
+                </a:solidFill>
+                <a:latin typeface="Calibri"/>
+              </a:rPr>
+              <a:t>known in advance</a:t>
+            </a:r>
+            <a:r>
+              <a:rPr lang="en-US" b="0" baseline="0" dirty="0" smtClean="0">
+                <a:solidFill>
+                  <a:schemeClr val="tx1"/>
+                </a:solidFill>
+                <a:latin typeface="Calibri"/>
+              </a:rPr>
+              <a:t>.</a:t>
             </a:r>
           </a:p>
           <a:p>
             <a:pPr lvl="1" algn="just"/>
+            <a:endParaRPr lang="en-US" b="0" baseline="0" dirty="0" smtClean="0">
+              <a:solidFill>
+                <a:schemeClr val="tx1"/>
+              </a:solidFill>
+              <a:latin typeface="Calibri"/>
+            </a:endParaRPr>
+          </a:p>
+          <a:p>
+            <a:pPr lvl="1" algn="just"/>
             <a:r>
               <a:rPr lang="en-US" b="1" baseline="0" dirty="0" smtClean="0">
                 <a:solidFill>
@@ -5103,7 +4909,16 @@
                 </a:solidFill>
                 <a:latin typeface="Calibri"/>
               </a:rPr>
-              <a:t>The data integration problem in the presence of services as data providers redefined the problem as follows: Given a query expressing data requirements, look up data services that can fulfill those requirements. The assumptions were that services exported their API and that they can export data under a pivot model that can be used for integrating results.</a:t>
+              <a:t>The data integration problem in the presence of services as data providers redefined the problem as follows: Given a query expressing data requirements, look up data services that can fulfill those requirements. </a:t>
+            </a:r>
+            <a:r>
+              <a:rPr lang="en-US" b="0" baseline="0" dirty="0" smtClean="0">
+                <a:solidFill>
+                  <a:schemeClr val="tx1"/>
+                </a:solidFill>
+                <a:latin typeface="Calibri"/>
+              </a:rPr>
+              <a:t>The assumptions were that services exported their API and that they can export data under a pivot model that can be used for integrating results.</a:t>
             </a:r>
           </a:p>
           <a:p>
@@ -5124,7 +4939,7 @@
                 </a:solidFill>
                 <a:latin typeface="Calibri"/>
               </a:rPr>
-              <a:t>Click</a:t>
+              <a:t>Click 2x</a:t>
             </a:r>
           </a:p>
           <a:p>
@@ -5139,33 +4954,33 @@
           <a:p>
             <a:pPr lvl="1" algn="just"/>
             <a:r>
+              <a:rPr lang="en-US" b="0" baseline="0" dirty="0" smtClean="0">
+                <a:solidFill>
+                  <a:schemeClr val="tx1"/>
+                </a:solidFill>
+                <a:latin typeface="Calibri"/>
+              </a:rPr>
+              <a:t>The query rewriting problem was redefined as </a:t>
+            </a:r>
+            <a:r>
               <a:rPr lang="en-US" b="1" baseline="0" dirty="0" smtClean="0">
                 <a:solidFill>
                   <a:schemeClr val="tx1"/>
                 </a:solidFill>
                 <a:latin typeface="Calibri"/>
               </a:rPr>
-              <a:t>The query rewriting problem was redefined as a matching and a service composition problem and has led to fruitful results on query rewriting and service </a:t>
-            </a:r>
-            <a:r>
-              <a:rPr lang="en-US" b="1" baseline="0" dirty="0" err="1" smtClean="0">
+              <a:t>a matching and a service composition problem </a:t>
+            </a:r>
+            <a:r>
+              <a:rPr lang="en-US" b="0" baseline="0" dirty="0" smtClean="0">
                 <a:solidFill>
                   <a:schemeClr val="tx1"/>
                 </a:solidFill>
                 <a:latin typeface="Calibri"/>
               </a:rPr>
-              <a:t>mathcing</a:t>
-            </a:r>
-            <a:r>
-              <a:rPr lang="en-US" b="1" baseline="0" dirty="0" smtClean="0">
-                <a:solidFill>
-                  <a:schemeClr val="tx1"/>
-                </a:solidFill>
-                <a:latin typeface="Calibri"/>
-              </a:rPr>
-              <a:t>.</a:t>
-            </a:r>
-            <a:endParaRPr lang="en-US" b="1" dirty="0">
+              <a:t>and has led to fruitful results on query rewriting and service matching.</a:t>
+            </a:r>
+            <a:endParaRPr lang="en-US" b="0" dirty="0">
               <a:solidFill>
                 <a:schemeClr val="tx1"/>
               </a:solidFill>
@@ -5973,6 +5788,12 @@
           </a:p>
           <a:p>
             <a:r>
+              <a:rPr lang="en-US" dirty="0" smtClean="0">
+                <a:latin typeface="Calibri"/>
+              </a:rPr>
+              <a:t> A4??</a:t>
+            </a:r>
+            <a:r>
               <a:rPr lang="en-US" dirty="0">
                 <a:latin typeface="Calibri"/>
               </a:rPr>
@@ -6191,22 +6012,22 @@
           <a:lstStyle/>
           <a:p>
             <a:r>
-              <a:rPr lang="fr-FR" dirty="0" smtClean="0">
+              <a:rPr lang="fr-FR" b="1" dirty="0" smtClean="0">
                 <a:latin typeface="Calibri"/>
               </a:rPr>
               <a:t>Given the query</a:t>
+            </a:r>
+            <a:r>
+              <a:rPr lang="fr-FR" b="1" baseline="0" dirty="0" smtClean="0">
+                <a:latin typeface="Calibri"/>
+              </a:rPr>
+              <a:t>, the different concrete services can be combined in order to produce results</a:t>
             </a:r>
             <a:r>
               <a:rPr lang="fr-FR" baseline="0" dirty="0" smtClean="0">
                 <a:latin typeface="Calibri"/>
               </a:rPr>
-              <a:t>, the different concrete services can be combined in order to produce results. </a:t>
-            </a:r>
-            <a:r>
-              <a:rPr lang="fr-FR" baseline="0" dirty="0" smtClean="0">
-                <a:latin typeface="Calibri"/>
-              </a:rPr>
-              <a:t>Such as composing:</a:t>
+              <a:t>. Such as composing:</a:t>
             </a:r>
           </a:p>
           <a:p>
@@ -6524,7 +6345,7 @@
           <a:p>
             <a:fld id="{68C2560D-EC28-3B41-86E8-18F1CE0113B4}" type="datetimeFigureOut">
               <a:rPr lang="en-US" smtClean="0"/>
-              <a:t>8/24/2016</a:t>
+              <a:t>8/30/2016</a:t>
             </a:fld>
             <a:endParaRPr lang="en-US"/>
           </a:p>
@@ -6732,7 +6553,7 @@
           <a:p>
             <a:fld id="{68C2560D-EC28-3B41-86E8-18F1CE0113B4}" type="datetimeFigureOut">
               <a:rPr lang="en-US" smtClean="0"/>
-              <a:t>8/24/2016</a:t>
+              <a:t>8/30/2016</a:t>
             </a:fld>
             <a:endParaRPr lang="en-US"/>
           </a:p>
@@ -6988,7 +6809,7 @@
           <a:p>
             <a:fld id="{68C2560D-EC28-3B41-86E8-18F1CE0113B4}" type="datetimeFigureOut">
               <a:rPr lang="en-US" smtClean="0"/>
-              <a:t>8/24/2016</a:t>
+              <a:t>8/30/2016</a:t>
             </a:fld>
             <a:endParaRPr lang="en-US"/>
           </a:p>
@@ -7162,7 +6983,7 @@
           <a:p>
             <a:fld id="{68C2560D-EC28-3B41-86E8-18F1CE0113B4}" type="datetimeFigureOut">
               <a:rPr lang="en-US" smtClean="0"/>
-              <a:t>8/24/2016</a:t>
+              <a:t>8/30/2016</a:t>
             </a:fld>
             <a:endParaRPr lang="en-US"/>
           </a:p>
@@ -7505,7 +7326,7 @@
           <a:p>
             <a:fld id="{68C2560D-EC28-3B41-86E8-18F1CE0113B4}" type="datetimeFigureOut">
               <a:rPr lang="en-US" smtClean="0"/>
-              <a:t>8/24/2016</a:t>
+              <a:t>8/30/2016</a:t>
             </a:fld>
             <a:endParaRPr lang="en-US"/>
           </a:p>
@@ -7780,7 +7601,7 @@
           <a:p>
             <a:fld id="{68C2560D-EC28-3B41-86E8-18F1CE0113B4}" type="datetimeFigureOut">
               <a:rPr lang="en-US" smtClean="0"/>
-              <a:t>8/24/2016</a:t>
+              <a:t>8/30/2016</a:t>
             </a:fld>
             <a:endParaRPr lang="en-US"/>
           </a:p>
@@ -8159,7 +7980,7 @@
           <a:p>
             <a:fld id="{68C2560D-EC28-3B41-86E8-18F1CE0113B4}" type="datetimeFigureOut">
               <a:rPr lang="en-US" smtClean="0"/>
-              <a:t>8/24/2016</a:t>
+              <a:t>8/30/2016</a:t>
             </a:fld>
             <a:endParaRPr lang="en-US"/>
           </a:p>
@@ -8277,7 +8098,7 @@
           <a:p>
             <a:fld id="{68C2560D-EC28-3B41-86E8-18F1CE0113B4}" type="datetimeFigureOut">
               <a:rPr lang="en-US" smtClean="0"/>
-              <a:t>8/24/2016</a:t>
+              <a:t>8/30/2016</a:t>
             </a:fld>
             <a:endParaRPr lang="en-US"/>
           </a:p>
@@ -8448,7 +8269,7 @@
           <a:p>
             <a:fld id="{68C2560D-EC28-3B41-86E8-18F1CE0113B4}" type="datetimeFigureOut">
               <a:rPr lang="en-US" smtClean="0"/>
-              <a:t>8/24/2016</a:t>
+              <a:t>8/30/2016</a:t>
             </a:fld>
             <a:endParaRPr lang="en-US"/>
           </a:p>
@@ -8802,7 +8623,7 @@
           <a:p>
             <a:fld id="{68C2560D-EC28-3B41-86E8-18F1CE0113B4}" type="datetimeFigureOut">
               <a:rPr lang="en-US" smtClean="0"/>
-              <a:t>8/24/2016</a:t>
+              <a:t>8/30/2016</a:t>
             </a:fld>
             <a:endParaRPr lang="en-US"/>
           </a:p>
@@ -9184,7 +9005,7 @@
           <a:p>
             <a:fld id="{68C2560D-EC28-3B41-86E8-18F1CE0113B4}" type="datetimeFigureOut">
               <a:rPr lang="en-US" smtClean="0"/>
-              <a:t>8/24/2016</a:t>
+              <a:t>8/30/2016</a:t>
             </a:fld>
             <a:endParaRPr lang="en-US"/>
           </a:p>
@@ -9471,7 +9292,7 @@
           <a:p>
             <a:fld id="{68C2560D-EC28-3B41-86E8-18F1CE0113B4}" type="datetimeFigureOut">
               <a:rPr lang="en-US" smtClean="0"/>
-              <a:t>8/24/2016</a:t>
+              <a:t>8/30/2016</a:t>
             </a:fld>
             <a:endParaRPr lang="en-US"/>
           </a:p>
@@ -29641,18 +29462,7 @@
                 <a:ea typeface="Consolas" charset="0"/>
                 <a:cs typeface="Consolas" charset="0"/>
               </a:rPr>
-              <a:t>dis= </a:t>
-            </a:r>
-            <a:r>
-              <a:rPr lang="en-US" sz="1400" dirty="0" smtClean="0">
-                <a:solidFill>
-                  <a:srgbClr val="0070C0"/>
-                </a:solidFill>
-                <a:latin typeface="Consolas" charset="0"/>
-                <a:ea typeface="Consolas" charset="0"/>
-                <a:cs typeface="Consolas" charset="0"/>
-              </a:rPr>
-              <a:t>“flu”,  [ 	availability &gt; 98%, </a:t>
+              <a:t>dis= “flu”,  [ 	availability &gt; 98%, </a:t>
             </a:r>
           </a:p>
           <a:p>
@@ -34642,18 +34452,7 @@
                 <a:ea typeface="Consolas" charset="0"/>
                 <a:cs typeface="Consolas" charset="0"/>
               </a:rPr>
-              <a:t>dis= </a:t>
-            </a:r>
-            <a:r>
-              <a:rPr lang="en-US" sz="1400" dirty="0" smtClean="0">
-                <a:solidFill>
-                  <a:srgbClr val="0070C0"/>
-                </a:solidFill>
-                <a:latin typeface="Consolas" charset="0"/>
-                <a:ea typeface="Consolas" charset="0"/>
-                <a:cs typeface="Consolas" charset="0"/>
-              </a:rPr>
-              <a:t>“flu”,  [ 	availability &gt; 98%, </a:t>
+              <a:t>dis= “flu”,  [ 	availability &gt; 98%, </a:t>
             </a:r>
           </a:p>
           <a:p>
@@ -40472,7 +40271,7 @@
                             </p:stCondLst>
                             <p:childTnLst>
                               <p:par>
-                                <p:cTn id="5" presetID="1" presetClass="entr" presetSubtype="0" fill="hold" nodeType="clickEffect">
+                                <p:cTn id="5" presetID="10" presetClass="entr" presetSubtype="0" fill="hold" nodeType="clickEffect">
                                   <p:stCondLst>
                                     <p:cond delay="0"/>
                                   </p:stCondLst>
@@ -40480,6 +40279,59 @@
                                     <p:set>
                                       <p:cBhvr>
                                         <p:cTn id="6" dur="1" fill="hold">
+                                          <p:stCondLst>
+                                            <p:cond delay="0"/>
+                                          </p:stCondLst>
+                                        </p:cTn>
+                                        <p:tgtEl>
+                                          <p:spTgt spid="31"/>
+                                        </p:tgtEl>
+                                        <p:attrNameLst>
+                                          <p:attrName>style.visibility</p:attrName>
+                                        </p:attrNameLst>
+                                      </p:cBhvr>
+                                      <p:to>
+                                        <p:strVal val="visible"/>
+                                      </p:to>
+                                    </p:set>
+                                    <p:animEffect transition="in" filter="fade">
+                                      <p:cBhvr>
+                                        <p:cTn id="7" dur="500"/>
+                                        <p:tgtEl>
+                                          <p:spTgt spid="31"/>
+                                        </p:tgtEl>
+                                      </p:cBhvr>
+                                    </p:animEffect>
+                                  </p:childTnLst>
+                                </p:cTn>
+                              </p:par>
+                            </p:childTnLst>
+                          </p:cTn>
+                        </p:par>
+                      </p:childTnLst>
+                    </p:cTn>
+                  </p:par>
+                  <p:par>
+                    <p:cTn id="8" fill="hold">
+                      <p:stCondLst>
+                        <p:cond delay="indefinite"/>
+                      </p:stCondLst>
+                      <p:childTnLst>
+                        <p:par>
+                          <p:cTn id="9" fill="hold">
+                            <p:stCondLst>
+                              <p:cond delay="0"/>
+                            </p:stCondLst>
+                            <p:childTnLst>
+                              <p:par>
+                                <p:cTn id="10" presetID="10" presetClass="entr" presetSubtype="0" fill="hold" nodeType="clickEffect">
+                                  <p:stCondLst>
+                                    <p:cond delay="0"/>
+                                  </p:stCondLst>
+                                  <p:childTnLst>
+                                    <p:set>
+                                      <p:cBhvr>
+                                        <p:cTn id="11" dur="1" fill="hold">
                                           <p:stCondLst>
                                             <p:cond delay="0"/>
                                           </p:stCondLst>
@@ -40495,51 +40347,14 @@
                                         <p:strVal val="visible"/>
                                       </p:to>
                                     </p:set>
-                                  </p:childTnLst>
-                                </p:cTn>
-                              </p:par>
-                            </p:childTnLst>
-                          </p:cTn>
-                        </p:par>
-                      </p:childTnLst>
-                    </p:cTn>
-                  </p:par>
-                  <p:par>
-                    <p:cTn id="7" fill="hold">
-                      <p:stCondLst>
-                        <p:cond delay="indefinite"/>
-                      </p:stCondLst>
-                      <p:childTnLst>
-                        <p:par>
-                          <p:cTn id="8" fill="hold">
-                            <p:stCondLst>
-                              <p:cond delay="0"/>
-                            </p:stCondLst>
-                            <p:childTnLst>
-                              <p:par>
-                                <p:cTn id="9" presetID="1" presetClass="entr" presetSubtype="0" fill="hold" nodeType="clickEffect">
-                                  <p:stCondLst>
-                                    <p:cond delay="0"/>
-                                  </p:stCondLst>
-                                  <p:childTnLst>
-                                    <p:set>
+                                    <p:animEffect transition="in" filter="fade">
                                       <p:cBhvr>
-                                        <p:cTn id="10" dur="1" fill="hold">
-                                          <p:stCondLst>
-                                            <p:cond delay="0"/>
-                                          </p:stCondLst>
-                                        </p:cTn>
+                                        <p:cTn id="12" dur="500"/>
                                         <p:tgtEl>
-                                          <p:spTgt spid="31"/>
+                                          <p:spTgt spid="26"/>
                                         </p:tgtEl>
-                                        <p:attrNameLst>
-                                          <p:attrName>style.visibility</p:attrName>
-                                        </p:attrNameLst>
                                       </p:cBhvr>
-                                      <p:to>
-                                        <p:strVal val="visible"/>
-                                      </p:to>
-                                    </p:set>
+                                    </p:animEffect>
                                   </p:childTnLst>
                                 </p:cTn>
                               </p:par>
@@ -46770,45 +46585,6 @@
       </p:sp>
       <p:sp>
         <p:nvSpPr>
-          <p:cNvPr id="67" name="ZoneTexte 23"/>
-          <p:cNvSpPr txBox="1"/>
-          <p:nvPr/>
-        </p:nvSpPr>
-        <p:spPr>
-          <a:xfrm>
-            <a:off x="561352" y="3914557"/>
-            <a:ext cx="2770057" cy="523220"/>
-          </a:xfrm>
-          <a:prstGeom prst="rect">
-            <a:avLst/>
-          </a:prstGeom>
-          <a:noFill/>
-        </p:spPr>
-        <p:txBody>
-          <a:bodyPr wrap="square" rtlCol="0">
-            <a:spAutoFit/>
-          </a:bodyPr>
-          <a:lstStyle/>
-          <a:p>
-            <a:r>
-              <a:rPr lang="fr-FR" sz="1400" dirty="0" smtClean="0">
-                <a:latin typeface="+mj-lt"/>
-              </a:rPr>
-              <a:t>Availabity &gt; 97%</a:t>
-            </a:r>
-          </a:p>
-          <a:p>
-            <a:r>
-              <a:rPr lang="fr-FR" sz="1400" dirty="0" smtClean="0">
-                <a:latin typeface="+mj-lt"/>
-              </a:rPr>
-              <a:t>Price per call = 0,1$</a:t>
-            </a:r>
-          </a:p>
-        </p:txBody>
-      </p:sp>
-      <p:sp>
-        <p:nvSpPr>
           <p:cNvPr id="68" name="Parchemin vertical 77"/>
           <p:cNvSpPr/>
           <p:nvPr/>
@@ -46865,97 +46641,6 @@
                 <a:schemeClr val="tx1"/>
               </a:solidFill>
               <a:latin typeface="+mj-lt"/>
-            </a:endParaRPr>
-          </a:p>
-        </p:txBody>
-      </p:sp>
-      <p:cxnSp>
-        <p:nvCxnSpPr>
-          <p:cNvPr id="25" name="Conector angulado 24"/>
-          <p:cNvCxnSpPr>
-            <a:stCxn id="68" idx="1"/>
-            <a:endCxn id="27" idx="1"/>
-          </p:cNvCxnSpPr>
-          <p:nvPr/>
-        </p:nvCxnSpPr>
-        <p:spPr>
-          <a:xfrm flipH="1">
-            <a:off x="520714" y="2159415"/>
-            <a:ext cx="543643" cy="2016752"/>
-          </a:xfrm>
-          <a:prstGeom prst="bentConnector5">
-            <a:avLst>
-              <a:gd name="adj1" fmla="val 142501"/>
-              <a:gd name="adj2" fmla="val 47699"/>
-              <a:gd name="adj3" fmla="val 142050"/>
-            </a:avLst>
-          </a:prstGeom>
-          <a:ln>
-            <a:solidFill>
-              <a:srgbClr val="FF0000"/>
-            </a:solidFill>
-            <a:prstDash val="dashDot"/>
-            <a:tailEnd type="triangle"/>
-          </a:ln>
-        </p:spPr>
-        <p:style>
-          <a:lnRef idx="2">
-            <a:schemeClr val="accent2"/>
-          </a:lnRef>
-          <a:fillRef idx="0">
-            <a:schemeClr val="accent2"/>
-          </a:fillRef>
-          <a:effectRef idx="1">
-            <a:schemeClr val="accent2"/>
-          </a:effectRef>
-          <a:fontRef idx="minor">
-            <a:schemeClr val="tx1"/>
-          </a:fontRef>
-        </p:style>
-      </p:cxnSp>
-      <p:sp>
-        <p:nvSpPr>
-          <p:cNvPr id="27" name="Chave esquerda 26"/>
-          <p:cNvSpPr/>
-          <p:nvPr/>
-        </p:nvSpPr>
-        <p:spPr>
-          <a:xfrm>
-            <a:off x="520714" y="3914557"/>
-            <a:ext cx="143802" cy="523220"/>
-          </a:xfrm>
-          <a:prstGeom prst="leftBrace">
-            <a:avLst/>
-          </a:prstGeom>
-          <a:ln>
-            <a:solidFill>
-              <a:srgbClr val="FF0000"/>
-            </a:solidFill>
-          </a:ln>
-        </p:spPr>
-        <p:style>
-          <a:lnRef idx="2">
-            <a:schemeClr val="accent2"/>
-          </a:lnRef>
-          <a:fillRef idx="0">
-            <a:schemeClr val="accent2"/>
-          </a:fillRef>
-          <a:effectRef idx="1">
-            <a:schemeClr val="accent2"/>
-          </a:effectRef>
-          <a:fontRef idx="minor">
-            <a:schemeClr val="tx1"/>
-          </a:fontRef>
-        </p:style>
-        <p:txBody>
-          <a:bodyPr rtlCol="0" anchor="ctr"/>
-          <a:lstStyle/>
-          <a:p>
-            <a:pPr algn="ctr"/>
-            <a:endParaRPr lang="fr-FR">
-              <a:solidFill>
-                <a:srgbClr val="FF0000"/>
-              </a:solidFill>
             </a:endParaRPr>
           </a:p>
         </p:txBody>
@@ -47084,266 +46769,6 @@
           </a:p>
         </p:txBody>
       </p:sp>
-      <p:sp>
-        <p:nvSpPr>
-          <p:cNvPr id="82" name="ZoneTexte 23"/>
-          <p:cNvSpPr txBox="1"/>
-          <p:nvPr/>
-        </p:nvSpPr>
-        <p:spPr>
-          <a:xfrm>
-            <a:off x="6179150" y="4008858"/>
-            <a:ext cx="2770057" cy="523220"/>
-          </a:xfrm>
-          <a:prstGeom prst="rect">
-            <a:avLst/>
-          </a:prstGeom>
-          <a:noFill/>
-        </p:spPr>
-        <p:txBody>
-          <a:bodyPr wrap="square" rtlCol="0">
-            <a:spAutoFit/>
-          </a:bodyPr>
-          <a:lstStyle/>
-          <a:p>
-            <a:r>
-              <a:rPr lang="fr-FR" sz="1400" dirty="0" smtClean="0">
-                <a:latin typeface="+mj-lt"/>
-              </a:rPr>
-              <a:t>Availabity &gt; 98%</a:t>
-            </a:r>
-          </a:p>
-          <a:p>
-            <a:r>
-              <a:rPr lang="fr-FR" sz="1400" dirty="0" smtClean="0">
-                <a:latin typeface="+mj-lt"/>
-              </a:rPr>
-              <a:t>Price per call = 0,3$</a:t>
-            </a:r>
-          </a:p>
-        </p:txBody>
-      </p:sp>
-      <p:sp>
-        <p:nvSpPr>
-          <p:cNvPr id="83" name="Chave esquerda 82"/>
-          <p:cNvSpPr/>
-          <p:nvPr/>
-        </p:nvSpPr>
-        <p:spPr>
-          <a:xfrm>
-            <a:off x="6138512" y="4008858"/>
-            <a:ext cx="143802" cy="523220"/>
-          </a:xfrm>
-          <a:prstGeom prst="leftBrace">
-            <a:avLst/>
-          </a:prstGeom>
-          <a:ln>
-            <a:solidFill>
-              <a:srgbClr val="FF0000"/>
-            </a:solidFill>
-          </a:ln>
-        </p:spPr>
-        <p:style>
-          <a:lnRef idx="2">
-            <a:schemeClr val="accent2"/>
-          </a:lnRef>
-          <a:fillRef idx="0">
-            <a:schemeClr val="accent2"/>
-          </a:fillRef>
-          <a:effectRef idx="1">
-            <a:schemeClr val="accent2"/>
-          </a:effectRef>
-          <a:fontRef idx="minor">
-            <a:schemeClr val="tx1"/>
-          </a:fontRef>
-        </p:style>
-        <p:txBody>
-          <a:bodyPr rtlCol="0" anchor="ctr"/>
-          <a:lstStyle/>
-          <a:p>
-            <a:pPr algn="ctr"/>
-            <a:endParaRPr lang="fr-FR">
-              <a:solidFill>
-                <a:srgbClr val="FF0000"/>
-              </a:solidFill>
-            </a:endParaRPr>
-          </a:p>
-        </p:txBody>
-      </p:sp>
-      <p:cxnSp>
-        <p:nvCxnSpPr>
-          <p:cNvPr id="35" name="Conector angulado 34"/>
-          <p:cNvCxnSpPr>
-            <a:stCxn id="80" idx="1"/>
-            <a:endCxn id="83" idx="1"/>
-          </p:cNvCxnSpPr>
-          <p:nvPr/>
-        </p:nvCxnSpPr>
-        <p:spPr>
-          <a:xfrm flipH="1">
-            <a:off x="6138512" y="2143592"/>
-            <a:ext cx="753253" cy="2126876"/>
-          </a:xfrm>
-          <a:prstGeom prst="bentConnector5">
-            <a:avLst>
-              <a:gd name="adj1" fmla="val 130245"/>
-              <a:gd name="adj2" fmla="val 47818"/>
-              <a:gd name="adj3" fmla="val 130348"/>
-            </a:avLst>
-          </a:prstGeom>
-          <a:ln>
-            <a:solidFill>
-              <a:srgbClr val="FF0000"/>
-            </a:solidFill>
-            <a:prstDash val="dashDot"/>
-            <a:tailEnd type="triangle"/>
-          </a:ln>
-        </p:spPr>
-        <p:style>
-          <a:lnRef idx="2">
-            <a:schemeClr val="accent2"/>
-          </a:lnRef>
-          <a:fillRef idx="0">
-            <a:schemeClr val="accent2"/>
-          </a:fillRef>
-          <a:effectRef idx="1">
-            <a:schemeClr val="accent2"/>
-          </a:effectRef>
-          <a:fontRef idx="minor">
-            <a:schemeClr val="tx1"/>
-          </a:fontRef>
-        </p:style>
-      </p:cxnSp>
-      <p:sp>
-        <p:nvSpPr>
-          <p:cNvPr id="86" name="ZoneTexte 23"/>
-          <p:cNvSpPr txBox="1"/>
-          <p:nvPr/>
-        </p:nvSpPr>
-        <p:spPr>
-          <a:xfrm>
-            <a:off x="3512257" y="2131178"/>
-            <a:ext cx="2770057" cy="523220"/>
-          </a:xfrm>
-          <a:prstGeom prst="rect">
-            <a:avLst/>
-          </a:prstGeom>
-          <a:noFill/>
-        </p:spPr>
-        <p:txBody>
-          <a:bodyPr wrap="square" rtlCol="0">
-            <a:spAutoFit/>
-          </a:bodyPr>
-          <a:lstStyle/>
-          <a:p>
-            <a:r>
-              <a:rPr lang="fr-FR" sz="1400" dirty="0" smtClean="0">
-                <a:latin typeface="+mj-lt"/>
-              </a:rPr>
-              <a:t>Availabity &gt; 99,9%</a:t>
-            </a:r>
-          </a:p>
-          <a:p>
-            <a:r>
-              <a:rPr lang="fr-FR" sz="1400" dirty="0" smtClean="0">
-                <a:latin typeface="+mj-lt"/>
-              </a:rPr>
-              <a:t>Price per call = 0,5$</a:t>
-            </a:r>
-          </a:p>
-        </p:txBody>
-      </p:sp>
-      <p:sp>
-        <p:nvSpPr>
-          <p:cNvPr id="87" name="Chave esquerda 86"/>
-          <p:cNvSpPr/>
-          <p:nvPr/>
-        </p:nvSpPr>
-        <p:spPr>
-          <a:xfrm>
-            <a:off x="3471619" y="2131178"/>
-            <a:ext cx="143802" cy="523220"/>
-          </a:xfrm>
-          <a:prstGeom prst="leftBrace">
-            <a:avLst/>
-          </a:prstGeom>
-          <a:ln>
-            <a:solidFill>
-              <a:srgbClr val="FF0000"/>
-            </a:solidFill>
-          </a:ln>
-        </p:spPr>
-        <p:style>
-          <a:lnRef idx="2">
-            <a:schemeClr val="accent2"/>
-          </a:lnRef>
-          <a:fillRef idx="0">
-            <a:schemeClr val="accent2"/>
-          </a:fillRef>
-          <a:effectRef idx="1">
-            <a:schemeClr val="accent2"/>
-          </a:effectRef>
-          <a:fontRef idx="minor">
-            <a:schemeClr val="tx1"/>
-          </a:fontRef>
-        </p:style>
-        <p:txBody>
-          <a:bodyPr rtlCol="0" anchor="ctr"/>
-          <a:lstStyle/>
-          <a:p>
-            <a:pPr algn="ctr"/>
-            <a:endParaRPr lang="fr-FR">
-              <a:solidFill>
-                <a:srgbClr val="FF0000"/>
-              </a:solidFill>
-            </a:endParaRPr>
-          </a:p>
-        </p:txBody>
-      </p:sp>
-      <p:cxnSp>
-        <p:nvCxnSpPr>
-          <p:cNvPr id="38" name="Conector angulado 37"/>
-          <p:cNvCxnSpPr>
-            <a:stCxn id="79" idx="1"/>
-            <a:endCxn id="87" idx="1"/>
-          </p:cNvCxnSpPr>
-          <p:nvPr/>
-        </p:nvCxnSpPr>
-        <p:spPr>
-          <a:xfrm flipH="1" flipV="1">
-            <a:off x="3471619" y="2392788"/>
-            <a:ext cx="507754" cy="1040621"/>
-          </a:xfrm>
-          <a:prstGeom prst="bentConnector5">
-            <a:avLst>
-              <a:gd name="adj1" fmla="val 144445"/>
-              <a:gd name="adj2" fmla="val 45541"/>
-              <a:gd name="adj3" fmla="val 145022"/>
-            </a:avLst>
-          </a:prstGeom>
-          <a:ln>
-            <a:solidFill>
-              <a:srgbClr val="FF0000"/>
-            </a:solidFill>
-            <a:prstDash val="dashDot"/>
-            <a:tailEnd type="triangle"/>
-          </a:ln>
-        </p:spPr>
-        <p:style>
-          <a:lnRef idx="2">
-            <a:schemeClr val="accent2"/>
-          </a:lnRef>
-          <a:fillRef idx="0">
-            <a:schemeClr val="accent2"/>
-          </a:fillRef>
-          <a:effectRef idx="1">
-            <a:schemeClr val="accent2"/>
-          </a:effectRef>
-          <a:fontRef idx="minor">
-            <a:schemeClr val="tx1"/>
-          </a:fontRef>
-        </p:style>
-      </p:cxnSp>
       <p:pic>
         <p:nvPicPr>
           <p:cNvPr id="2050" name="Picture 2" descr="https://salesdatalist.com/wp-content/uploads/2012/04/consumers-list-icon.png"/>
@@ -47427,7 +46852,7 @@
         </p:nvSpPr>
         <p:spPr>
           <a:xfrm>
-            <a:off x="272656" y="2274936"/>
+            <a:off x="272656" y="2203220"/>
             <a:ext cx="8644407" cy="1511389"/>
           </a:xfrm>
           <a:prstGeom prst="rect">
@@ -47464,7 +46889,7 @@
           <a:p>
             <a:pPr algn="just"/>
             <a:r>
-              <a:rPr lang="en-US" sz="1200" smtClean="0">
+              <a:rPr lang="en-US" sz="1200" dirty="0" smtClean="0">
                 <a:latin typeface="Consolas" charset="0"/>
                 <a:ea typeface="Consolas" charset="0"/>
                 <a:cs typeface="Consolas" charset="0"/>
@@ -47655,7 +47080,7 @@
                             </p:stCondLst>
                             <p:childTnLst>
                               <p:par>
-                                <p:cTn id="5" presetID="10" presetClass="entr" presetSubtype="0" fill="hold" nodeType="clickEffect">
+                                <p:cTn id="5" presetID="10" presetClass="entr" presetSubtype="0" fill="hold" grpId="0" nodeType="clickEffect">
                                   <p:stCondLst>
                                     <p:cond delay="0"/>
                                   </p:stCondLst>
@@ -47668,11 +47093,7 @@
                                           </p:stCondLst>
                                         </p:cTn>
                                         <p:tgtEl>
-                                          <p:spTgt spid="2">
-                                            <p:txEl>
-                                              <p:pRg st="0" end="0"/>
-                                            </p:txEl>
-                                          </p:spTgt>
+                                          <p:spTgt spid="2"/>
                                         </p:tgtEl>
                                         <p:attrNameLst>
                                           <p:attrName>style.visibility</p:attrName>
@@ -47686,269 +47107,7 @@
                                       <p:cBhvr>
                                         <p:cTn id="7" dur="500"/>
                                         <p:tgtEl>
-                                          <p:spTgt spid="2">
-                                            <p:txEl>
-                                              <p:pRg st="0" end="0"/>
-                                            </p:txEl>
-                                          </p:spTgt>
-                                        </p:tgtEl>
-                                      </p:cBhvr>
-                                    </p:animEffect>
-                                  </p:childTnLst>
-                                </p:cTn>
-                              </p:par>
-                              <p:par>
-                                <p:cTn id="8" presetID="10" presetClass="entr" presetSubtype="0" fill="hold" nodeType="withEffect">
-                                  <p:stCondLst>
-                                    <p:cond delay="0"/>
-                                  </p:stCondLst>
-                                  <p:childTnLst>
-                                    <p:set>
-                                      <p:cBhvr>
-                                        <p:cTn id="9" dur="1" fill="hold">
-                                          <p:stCondLst>
-                                            <p:cond delay="0"/>
-                                          </p:stCondLst>
-                                        </p:cTn>
-                                        <p:tgtEl>
-                                          <p:spTgt spid="2">
-                                            <p:txEl>
-                                              <p:pRg st="1" end="1"/>
-                                            </p:txEl>
-                                          </p:spTgt>
-                                        </p:tgtEl>
-                                        <p:attrNameLst>
-                                          <p:attrName>style.visibility</p:attrName>
-                                        </p:attrNameLst>
-                                      </p:cBhvr>
-                                      <p:to>
-                                        <p:strVal val="visible"/>
-                                      </p:to>
-                                    </p:set>
-                                    <p:animEffect transition="in" filter="fade">
-                                      <p:cBhvr>
-                                        <p:cTn id="10" dur="500"/>
-                                        <p:tgtEl>
-                                          <p:spTgt spid="2">
-                                            <p:txEl>
-                                              <p:pRg st="1" end="1"/>
-                                            </p:txEl>
-                                          </p:spTgt>
-                                        </p:tgtEl>
-                                      </p:cBhvr>
-                                    </p:animEffect>
-                                  </p:childTnLst>
-                                </p:cTn>
-                              </p:par>
-                              <p:par>
-                                <p:cTn id="11" presetID="10" presetClass="entr" presetSubtype="0" fill="hold" nodeType="withEffect">
-                                  <p:stCondLst>
-                                    <p:cond delay="0"/>
-                                  </p:stCondLst>
-                                  <p:childTnLst>
-                                    <p:set>
-                                      <p:cBhvr>
-                                        <p:cTn id="12" dur="1" fill="hold">
-                                          <p:stCondLst>
-                                            <p:cond delay="0"/>
-                                          </p:stCondLst>
-                                        </p:cTn>
-                                        <p:tgtEl>
-                                          <p:spTgt spid="2">
-                                            <p:txEl>
-                                              <p:pRg st="2" end="2"/>
-                                            </p:txEl>
-                                          </p:spTgt>
-                                        </p:tgtEl>
-                                        <p:attrNameLst>
-                                          <p:attrName>style.visibility</p:attrName>
-                                        </p:attrNameLst>
-                                      </p:cBhvr>
-                                      <p:to>
-                                        <p:strVal val="visible"/>
-                                      </p:to>
-                                    </p:set>
-                                    <p:animEffect transition="in" filter="fade">
-                                      <p:cBhvr>
-                                        <p:cTn id="13" dur="500"/>
-                                        <p:tgtEl>
-                                          <p:spTgt spid="2">
-                                            <p:txEl>
-                                              <p:pRg st="2" end="2"/>
-                                            </p:txEl>
-                                          </p:spTgt>
-                                        </p:tgtEl>
-                                      </p:cBhvr>
-                                    </p:animEffect>
-                                  </p:childTnLst>
-                                </p:cTn>
-                              </p:par>
-                              <p:par>
-                                <p:cTn id="14" presetID="10" presetClass="entr" presetSubtype="0" fill="hold" nodeType="withEffect">
-                                  <p:stCondLst>
-                                    <p:cond delay="0"/>
-                                  </p:stCondLst>
-                                  <p:childTnLst>
-                                    <p:set>
-                                      <p:cBhvr>
-                                        <p:cTn id="15" dur="1" fill="hold">
-                                          <p:stCondLst>
-                                            <p:cond delay="0"/>
-                                          </p:stCondLst>
-                                        </p:cTn>
-                                        <p:tgtEl>
-                                          <p:spTgt spid="2">
-                                            <p:txEl>
-                                              <p:pRg st="3" end="3"/>
-                                            </p:txEl>
-                                          </p:spTgt>
-                                        </p:tgtEl>
-                                        <p:attrNameLst>
-                                          <p:attrName>style.visibility</p:attrName>
-                                        </p:attrNameLst>
-                                      </p:cBhvr>
-                                      <p:to>
-                                        <p:strVal val="visible"/>
-                                      </p:to>
-                                    </p:set>
-                                    <p:animEffect transition="in" filter="fade">
-                                      <p:cBhvr>
-                                        <p:cTn id="16" dur="500"/>
-                                        <p:tgtEl>
-                                          <p:spTgt spid="2">
-                                            <p:txEl>
-                                              <p:pRg st="3" end="3"/>
-                                            </p:txEl>
-                                          </p:spTgt>
-                                        </p:tgtEl>
-                                      </p:cBhvr>
-                                    </p:animEffect>
-                                  </p:childTnLst>
-                                </p:cTn>
-                              </p:par>
-                              <p:par>
-                                <p:cTn id="17" presetID="10" presetClass="entr" presetSubtype="0" fill="hold" nodeType="withEffect">
-                                  <p:stCondLst>
-                                    <p:cond delay="0"/>
-                                  </p:stCondLst>
-                                  <p:childTnLst>
-                                    <p:set>
-                                      <p:cBhvr>
-                                        <p:cTn id="18" dur="1" fill="hold">
-                                          <p:stCondLst>
-                                            <p:cond delay="0"/>
-                                          </p:stCondLst>
-                                        </p:cTn>
-                                        <p:tgtEl>
-                                          <p:spTgt spid="2">
-                                            <p:txEl>
-                                              <p:pRg st="4" end="4"/>
-                                            </p:txEl>
-                                          </p:spTgt>
-                                        </p:tgtEl>
-                                        <p:attrNameLst>
-                                          <p:attrName>style.visibility</p:attrName>
-                                        </p:attrNameLst>
-                                      </p:cBhvr>
-                                      <p:to>
-                                        <p:strVal val="visible"/>
-                                      </p:to>
-                                    </p:set>
-                                    <p:animEffect transition="in" filter="fade">
-                                      <p:cBhvr>
-                                        <p:cTn id="19" dur="500"/>
-                                        <p:tgtEl>
-                                          <p:spTgt spid="2">
-                                            <p:txEl>
-                                              <p:pRg st="4" end="4"/>
-                                            </p:txEl>
-                                          </p:spTgt>
-                                        </p:tgtEl>
-                                      </p:cBhvr>
-                                    </p:animEffect>
-                                  </p:childTnLst>
-                                </p:cTn>
-                              </p:par>
-                              <p:par>
-                                <p:cTn id="20" presetID="10" presetClass="entr" presetSubtype="0" fill="hold" nodeType="withEffect">
-                                  <p:stCondLst>
-                                    <p:cond delay="0"/>
-                                  </p:stCondLst>
-                                  <p:childTnLst>
-                                    <p:set>
-                                      <p:cBhvr>
-                                        <p:cTn id="21" dur="1" fill="hold">
-                                          <p:stCondLst>
-                                            <p:cond delay="0"/>
-                                          </p:stCondLst>
-                                        </p:cTn>
-                                        <p:tgtEl>
-                                          <p:spTgt spid="2">
-                                            <p:txEl>
-                                              <p:pRg st="5" end="5"/>
-                                            </p:txEl>
-                                          </p:spTgt>
-                                        </p:tgtEl>
-                                        <p:attrNameLst>
-                                          <p:attrName>style.visibility</p:attrName>
-                                        </p:attrNameLst>
-                                      </p:cBhvr>
-                                      <p:to>
-                                        <p:strVal val="visible"/>
-                                      </p:to>
-                                    </p:set>
-                                    <p:animEffect transition="in" filter="fade">
-                                      <p:cBhvr>
-                                        <p:cTn id="22" dur="500"/>
-                                        <p:tgtEl>
-                                          <p:spTgt spid="2">
-                                            <p:txEl>
-                                              <p:pRg st="5" end="5"/>
-                                            </p:txEl>
-                                          </p:spTgt>
-                                        </p:tgtEl>
-                                      </p:cBhvr>
-                                    </p:animEffect>
-                                  </p:childTnLst>
-                                </p:cTn>
-                              </p:par>
-                              <p:par>
-                                <p:cTn id="23" presetID="10" presetClass="entr" presetSubtype="0" fill="hold" nodeType="withEffect">
-                                  <p:stCondLst>
-                                    <p:cond delay="0"/>
-                                  </p:stCondLst>
-                                  <p:childTnLst>
-                                    <p:set>
-                                      <p:cBhvr>
-                                        <p:cTn id="24" dur="1" fill="hold">
-                                          <p:stCondLst>
-                                            <p:cond delay="0"/>
-                                          </p:stCondLst>
-                                        </p:cTn>
-                                        <p:tgtEl>
-                                          <p:spTgt spid="2">
-                                            <p:txEl>
-                                              <p:pRg st="6" end="6"/>
-                                            </p:txEl>
-                                          </p:spTgt>
-                                        </p:tgtEl>
-                                        <p:attrNameLst>
-                                          <p:attrName>style.visibility</p:attrName>
-                                        </p:attrNameLst>
-                                      </p:cBhvr>
-                                      <p:to>
-                                        <p:strVal val="visible"/>
-                                      </p:to>
-                                    </p:set>
-                                    <p:animEffect transition="in" filter="fade">
-                                      <p:cBhvr>
-                                        <p:cTn id="25" dur="500"/>
-                                        <p:tgtEl>
-                                          <p:spTgt spid="2">
-                                            <p:txEl>
-                                              <p:pRg st="6" end="6"/>
-                                            </p:txEl>
-                                          </p:spTgt>
+                                          <p:spTgt spid="2"/>
                                         </p:tgtEl>
                                       </p:cBhvr>
                                     </p:animEffect>
@@ -47982,6 +47141,9 @@
         </p:cTn>
       </p:par>
     </p:tnLst>
+    <p:bldLst>
+      <p:bldP spid="2" grpId="0" animBg="1"/>
+    </p:bldLst>
   </p:timing>
 </p:sld>
 </file>
@@ -48956,7 +48118,7 @@
         </p:blipFill>
         <p:spPr bwMode="auto">
           <a:xfrm>
-            <a:off x="4204350" y="1344226"/>
+            <a:off x="4204350" y="1272510"/>
             <a:ext cx="726660" cy="726660"/>
           </a:xfrm>
           <a:prstGeom prst="rect">

</xml_diff>